<commit_message>
Edited the presentation a bit
</commit_message>
<xml_diff>
--- a/CSDS_a Presentation.pptx
+++ b/CSDS_a Presentation.pptx
@@ -2570,7 +2570,7 @@
                 <a:spcPct val="100000"/>
               </a:lnSpc>
             </a:pPr>
-            <a:fld id="{8579DCBD-D1D8-4676-9A4E-DB6FBF2C7923}" type="slidenum">
+            <a:fld id="{4155B5D2-306C-456F-843F-E70DF218B903}" type="slidenum">
               <a:rPr lang="en-US" sz="1200" strike="noStrike">
                 <a:solidFill>
                   <a:srgbClr val="ffffff"/>
@@ -3219,7 +3219,7 @@
                 <a:spcPct val="100000"/>
               </a:lnSpc>
             </a:pPr>
-            <a:fld id="{F07CF861-CCE6-47EE-B5CD-D52C80E058AC}" type="slidenum">
+            <a:fld id="{EE64B0B8-3F49-4812-A1D7-FA764675CB87}" type="slidenum">
               <a:rPr lang="en-US" sz="1200" strike="noStrike">
                 <a:solidFill>
                   <a:srgbClr val="454545"/>
@@ -3691,7 +3691,7 @@
                 </a:solidFill>
                 <a:latin typeface="Corbel"/>
               </a:rPr>
-              <a:t>Dependency injection is  best</a:t>
+              <a:t>Dependency injection is best</a:t>
             </a:r>
             <a:endParaRPr/>
           </a:p>
@@ -3731,7 +3731,7 @@
                 </a:solidFill>
                 <a:latin typeface="Corbel"/>
               </a:rPr>
-              <a:t>Anything else?....</a:t>
+              <a:t>Breakdown in communication results in unproductive use of time and thus communication is crucial</a:t>
             </a:r>
             <a:endParaRPr/>
           </a:p>

</xml_diff>

<commit_message>
final presentation with screen shots
</commit_message>
<xml_diff>
--- a/CSDS_a Presentation.pptx
+++ b/CSDS_a Presentation.pptx
@@ -1,30 +1,126 @@
 
 <file path=ppt/presentation.xml><?xml version="1.0" encoding="utf-8"?>
-<p:presentation xmlns:a="http://schemas.openxmlformats.org/drawingml/2006/main" xmlns:p="http://schemas.openxmlformats.org/presentationml/2006/main" xmlns:r="http://schemas.openxmlformats.org/officeDocument/2006/relationships">
+<p:presentation xmlns:a="http://schemas.openxmlformats.org/drawingml/2006/main" xmlns:r="http://schemas.openxmlformats.org/officeDocument/2006/relationships" xmlns:p="http://schemas.openxmlformats.org/presentationml/2006/main">
   <p:sldMasterIdLst>
-    <p:sldMasterId id="2147483648" r:id="rId2"/>
-    <p:sldMasterId id="2147483661" r:id="rId3"/>
+    <p:sldMasterId id="2147483648" r:id="rId1"/>
+    <p:sldMasterId id="2147483661" r:id="rId2"/>
   </p:sldMasterIdLst>
   <p:sldIdLst>
-    <p:sldId id="256" r:id="rId4"/>
-    <p:sldId id="257" r:id="rId5"/>
-    <p:sldId id="258" r:id="rId6"/>
+    <p:sldId id="256" r:id="rId3"/>
+    <p:sldId id="257" r:id="rId4"/>
+    <p:sldId id="258" r:id="rId5"/>
+    <p:sldId id="267" r:id="rId6"/>
     <p:sldId id="259" r:id="rId7"/>
     <p:sldId id="260" r:id="rId8"/>
-    <p:sldId id="261" r:id="rId9"/>
-    <p:sldId id="262" r:id="rId10"/>
+    <p:sldId id="268" r:id="rId9"/>
+    <p:sldId id="261" r:id="rId10"/>
     <p:sldId id="263" r:id="rId11"/>
     <p:sldId id="264" r:id="rId12"/>
     <p:sldId id="265" r:id="rId13"/>
     <p:sldId id="266" r:id="rId14"/>
   </p:sldIdLst>
-  <p:sldSz cx="9144000" cy="6858000"/>
+  <p:sldSz cx="9144000" cy="6858000" type="screen4x3"/>
   <p:notesSz cx="7772400" cy="10058400"/>
+  <p:defaultTextStyle>
+    <a:defPPr>
+      <a:defRPr lang="en-US"/>
+    </a:defPPr>
+    <a:lvl1pPr marL="0" algn="l" defTabSz="914400" rtl="0" eaLnBrk="1" latinLnBrk="0" hangingPunct="1">
+      <a:defRPr sz="1800" kern="1200">
+        <a:solidFill>
+          <a:schemeClr val="tx1"/>
+        </a:solidFill>
+        <a:latin typeface="+mn-lt"/>
+        <a:ea typeface="+mn-ea"/>
+        <a:cs typeface="+mn-cs"/>
+      </a:defRPr>
+    </a:lvl1pPr>
+    <a:lvl2pPr marL="457200" algn="l" defTabSz="914400" rtl="0" eaLnBrk="1" latinLnBrk="0" hangingPunct="1">
+      <a:defRPr sz="1800" kern="1200">
+        <a:solidFill>
+          <a:schemeClr val="tx1"/>
+        </a:solidFill>
+        <a:latin typeface="+mn-lt"/>
+        <a:ea typeface="+mn-ea"/>
+        <a:cs typeface="+mn-cs"/>
+      </a:defRPr>
+    </a:lvl2pPr>
+    <a:lvl3pPr marL="914400" algn="l" defTabSz="914400" rtl="0" eaLnBrk="1" latinLnBrk="0" hangingPunct="1">
+      <a:defRPr sz="1800" kern="1200">
+        <a:solidFill>
+          <a:schemeClr val="tx1"/>
+        </a:solidFill>
+        <a:latin typeface="+mn-lt"/>
+        <a:ea typeface="+mn-ea"/>
+        <a:cs typeface="+mn-cs"/>
+      </a:defRPr>
+    </a:lvl3pPr>
+    <a:lvl4pPr marL="1371600" algn="l" defTabSz="914400" rtl="0" eaLnBrk="1" latinLnBrk="0" hangingPunct="1">
+      <a:defRPr sz="1800" kern="1200">
+        <a:solidFill>
+          <a:schemeClr val="tx1"/>
+        </a:solidFill>
+        <a:latin typeface="+mn-lt"/>
+        <a:ea typeface="+mn-ea"/>
+        <a:cs typeface="+mn-cs"/>
+      </a:defRPr>
+    </a:lvl4pPr>
+    <a:lvl5pPr marL="1828800" algn="l" defTabSz="914400" rtl="0" eaLnBrk="1" latinLnBrk="0" hangingPunct="1">
+      <a:defRPr sz="1800" kern="1200">
+        <a:solidFill>
+          <a:schemeClr val="tx1"/>
+        </a:solidFill>
+        <a:latin typeface="+mn-lt"/>
+        <a:ea typeface="+mn-ea"/>
+        <a:cs typeface="+mn-cs"/>
+      </a:defRPr>
+    </a:lvl5pPr>
+    <a:lvl6pPr marL="2286000" algn="l" defTabSz="914400" rtl="0" eaLnBrk="1" latinLnBrk="0" hangingPunct="1">
+      <a:defRPr sz="1800" kern="1200">
+        <a:solidFill>
+          <a:schemeClr val="tx1"/>
+        </a:solidFill>
+        <a:latin typeface="+mn-lt"/>
+        <a:ea typeface="+mn-ea"/>
+        <a:cs typeface="+mn-cs"/>
+      </a:defRPr>
+    </a:lvl6pPr>
+    <a:lvl7pPr marL="2743200" algn="l" defTabSz="914400" rtl="0" eaLnBrk="1" latinLnBrk="0" hangingPunct="1">
+      <a:defRPr sz="1800" kern="1200">
+        <a:solidFill>
+          <a:schemeClr val="tx1"/>
+        </a:solidFill>
+        <a:latin typeface="+mn-lt"/>
+        <a:ea typeface="+mn-ea"/>
+        <a:cs typeface="+mn-cs"/>
+      </a:defRPr>
+    </a:lvl7pPr>
+    <a:lvl8pPr marL="3200400" algn="l" defTabSz="914400" rtl="0" eaLnBrk="1" latinLnBrk="0" hangingPunct="1">
+      <a:defRPr sz="1800" kern="1200">
+        <a:solidFill>
+          <a:schemeClr val="tx1"/>
+        </a:solidFill>
+        <a:latin typeface="+mn-lt"/>
+        <a:ea typeface="+mn-ea"/>
+        <a:cs typeface="+mn-cs"/>
+      </a:defRPr>
+    </a:lvl8pPr>
+    <a:lvl9pPr marL="3657600" algn="l" defTabSz="914400" rtl="0" eaLnBrk="1" latinLnBrk="0" hangingPunct="1">
+      <a:defRPr sz="1800" kern="1200">
+        <a:solidFill>
+          <a:schemeClr val="tx1"/>
+        </a:solidFill>
+        <a:latin typeface="+mn-lt"/>
+        <a:ea typeface="+mn-ea"/>
+        <a:cs typeface="+mn-cs"/>
+      </a:defRPr>
+    </a:lvl9pPr>
+  </p:defaultTextStyle>
 </p:presentation>
 </file>
 
 <file path=ppt/slideLayouts/slideLayout1.xml><?xml version="1.0" encoding="utf-8"?>
-<p:sldLayout xmlns:a="http://schemas.openxmlformats.org/drawingml/2006/main" xmlns:p="http://schemas.openxmlformats.org/presentationml/2006/main" xmlns:r="http://schemas.openxmlformats.org/officeDocument/2006/relationships" type="blank" preserve="1">
+<p:sldLayout xmlns:a="http://schemas.openxmlformats.org/drawingml/2006/main" xmlns:r="http://schemas.openxmlformats.org/officeDocument/2006/relationships" xmlns:p="http://schemas.openxmlformats.org/presentationml/2006/main" type="blank" preserve="1">
   <p:cSld name="Blank Slide">
     <p:spTree>
       <p:nvGrpSpPr>
@@ -42,11 +138,14 @@
       </p:grpSpPr>
     </p:spTree>
   </p:cSld>
+  <p:clrMapOvr>
+    <a:masterClrMapping/>
+  </p:clrMapOvr>
 </p:sldLayout>
 </file>
 
 <file path=ppt/slideLayouts/slideLayout10.xml><?xml version="1.0" encoding="utf-8"?>
-<p:sldLayout xmlns:a="http://schemas.openxmlformats.org/drawingml/2006/main" xmlns:p="http://schemas.openxmlformats.org/presentationml/2006/main" xmlns:r="http://schemas.openxmlformats.org/officeDocument/2006/relationships" type="objOverTx" preserve="1">
+<p:sldLayout xmlns:a="http://schemas.openxmlformats.org/drawingml/2006/main" xmlns:r="http://schemas.openxmlformats.org/officeDocument/2006/relationships" xmlns:p="http://schemas.openxmlformats.org/presentationml/2006/main" type="objOverTx" preserve="1">
   <p:cSld name="Title, Content over Content">
     <p:spTree>
       <p:nvGrpSpPr>
@@ -82,7 +181,8 @@
           </a:prstGeom>
         </p:spPr>
         <p:txBody>
-          <a:bodyPr lIns="0" rIns="0" tIns="0" bIns="0" anchor="ctr"/>
+          <a:bodyPr lIns="0" tIns="0" rIns="0" bIns="0" anchor="ctr"/>
+          <a:lstStyle/>
           <a:p>
             <a:endParaRPr/>
           </a:p>
@@ -108,7 +208,8 @@
           </a:prstGeom>
         </p:spPr>
         <p:txBody>
-          <a:bodyPr lIns="0" rIns="0" tIns="0" bIns="0"/>
+          <a:bodyPr lIns="0" tIns="0" rIns="0" bIns="0"/>
+          <a:lstStyle/>
           <a:p>
             <a:endParaRPr/>
           </a:p>
@@ -134,7 +235,8 @@
           </a:prstGeom>
         </p:spPr>
         <p:txBody>
-          <a:bodyPr lIns="0" rIns="0" tIns="0" bIns="0"/>
+          <a:bodyPr lIns="0" tIns="0" rIns="0" bIns="0"/>
+          <a:lstStyle/>
           <a:p>
             <a:endParaRPr/>
           </a:p>
@@ -142,11 +244,14 @@
       </p:sp>
     </p:spTree>
   </p:cSld>
+  <p:clrMapOvr>
+    <a:masterClrMapping/>
+  </p:clrMapOvr>
 </p:sldLayout>
 </file>
 
 <file path=ppt/slideLayouts/slideLayout11.xml><?xml version="1.0" encoding="utf-8"?>
-<p:sldLayout xmlns:a="http://schemas.openxmlformats.org/drawingml/2006/main" xmlns:p="http://schemas.openxmlformats.org/presentationml/2006/main" xmlns:r="http://schemas.openxmlformats.org/officeDocument/2006/relationships" type="fourObj" preserve="1">
+<p:sldLayout xmlns:a="http://schemas.openxmlformats.org/drawingml/2006/main" xmlns:r="http://schemas.openxmlformats.org/officeDocument/2006/relationships" xmlns:p="http://schemas.openxmlformats.org/presentationml/2006/main" type="fourObj" preserve="1">
   <p:cSld name="Title, 4 Content">
     <p:spTree>
       <p:nvGrpSpPr>
@@ -182,7 +287,8 @@
           </a:prstGeom>
         </p:spPr>
         <p:txBody>
-          <a:bodyPr lIns="0" rIns="0" tIns="0" bIns="0" anchor="ctr"/>
+          <a:bodyPr lIns="0" tIns="0" rIns="0" bIns="0" anchor="ctr"/>
+          <a:lstStyle/>
           <a:p>
             <a:endParaRPr/>
           </a:p>
@@ -208,7 +314,8 @@
           </a:prstGeom>
         </p:spPr>
         <p:txBody>
-          <a:bodyPr lIns="0" rIns="0" tIns="0" bIns="0"/>
+          <a:bodyPr lIns="0" tIns="0" rIns="0" bIns="0"/>
+          <a:lstStyle/>
           <a:p>
             <a:endParaRPr/>
           </a:p>
@@ -234,7 +341,8 @@
           </a:prstGeom>
         </p:spPr>
         <p:txBody>
-          <a:bodyPr lIns="0" rIns="0" tIns="0" bIns="0"/>
+          <a:bodyPr lIns="0" tIns="0" rIns="0" bIns="0"/>
+          <a:lstStyle/>
           <a:p>
             <a:endParaRPr/>
           </a:p>
@@ -260,7 +368,8 @@
           </a:prstGeom>
         </p:spPr>
         <p:txBody>
-          <a:bodyPr lIns="0" rIns="0" tIns="0" bIns="0"/>
+          <a:bodyPr lIns="0" tIns="0" rIns="0" bIns="0"/>
+          <a:lstStyle/>
           <a:p>
             <a:endParaRPr/>
           </a:p>
@@ -286,7 +395,8 @@
           </a:prstGeom>
         </p:spPr>
         <p:txBody>
-          <a:bodyPr lIns="0" rIns="0" tIns="0" bIns="0"/>
+          <a:bodyPr lIns="0" tIns="0" rIns="0" bIns="0"/>
+          <a:lstStyle/>
           <a:p>
             <a:endParaRPr/>
           </a:p>
@@ -294,11 +404,14 @@
       </p:sp>
     </p:spTree>
   </p:cSld>
+  <p:clrMapOvr>
+    <a:masterClrMapping/>
+  </p:clrMapOvr>
 </p:sldLayout>
 </file>
 
 <file path=ppt/slideLayouts/slideLayout12.xml><?xml version="1.0" encoding="utf-8"?>
-<p:sldLayout xmlns:a="http://schemas.openxmlformats.org/drawingml/2006/main" xmlns:p="http://schemas.openxmlformats.org/presentationml/2006/main" xmlns:r="http://schemas.openxmlformats.org/officeDocument/2006/relationships" type="blank" preserve="1">
+<p:sldLayout xmlns:a="http://schemas.openxmlformats.org/drawingml/2006/main" xmlns:r="http://schemas.openxmlformats.org/officeDocument/2006/relationships" xmlns:p="http://schemas.openxmlformats.org/presentationml/2006/main" type="blank" preserve="1">
   <p:cSld name="Title, 6 Content">
     <p:spTree>
       <p:nvGrpSpPr>
@@ -334,7 +447,8 @@
           </a:prstGeom>
         </p:spPr>
         <p:txBody>
-          <a:bodyPr lIns="0" rIns="0" tIns="0" bIns="0" anchor="ctr"/>
+          <a:bodyPr lIns="0" tIns="0" rIns="0" bIns="0" anchor="ctr"/>
+          <a:lstStyle/>
           <a:p>
             <a:endParaRPr/>
           </a:p>
@@ -360,7 +474,8 @@
           </a:prstGeom>
         </p:spPr>
         <p:txBody>
-          <a:bodyPr lIns="0" rIns="0" tIns="0" bIns="0"/>
+          <a:bodyPr lIns="0" tIns="0" rIns="0" bIns="0"/>
+          <a:lstStyle/>
           <a:p>
             <a:endParaRPr/>
           </a:p>
@@ -386,7 +501,8 @@
           </a:prstGeom>
         </p:spPr>
         <p:txBody>
-          <a:bodyPr lIns="0" rIns="0" tIns="0" bIns="0"/>
+          <a:bodyPr lIns="0" tIns="0" rIns="0" bIns="0"/>
+          <a:lstStyle/>
           <a:p>
             <a:endParaRPr/>
           </a:p>
@@ -394,7 +510,7 @@
       </p:sp>
       <p:pic>
         <p:nvPicPr>
-          <p:cNvPr id="41" name="" descr=""/>
+          <p:cNvPr id="41" name="Picture 40"/>
           <p:cNvPicPr/>
           <p:nvPr/>
         </p:nvPicPr>
@@ -417,12 +533,12 @@
       </p:pic>
       <p:pic>
         <p:nvPicPr>
-          <p:cNvPr id="42" name="" descr=""/>
+          <p:cNvPr id="42" name="Picture 41"/>
           <p:cNvPicPr/>
           <p:nvPr/>
         </p:nvPicPr>
         <p:blipFill>
-          <a:blip r:embed="rId3"/>
+          <a:blip r:embed="rId2"/>
           <a:stretch/>
         </p:blipFill>
         <p:spPr>
@@ -440,11 +556,14 @@
       </p:pic>
     </p:spTree>
   </p:cSld>
+  <p:clrMapOvr>
+    <a:masterClrMapping/>
+  </p:clrMapOvr>
 </p:sldLayout>
 </file>
 
 <file path=ppt/slideLayouts/slideLayout13.xml><?xml version="1.0" encoding="utf-8"?>
-<p:sldLayout xmlns:a="http://schemas.openxmlformats.org/drawingml/2006/main" xmlns:p="http://schemas.openxmlformats.org/presentationml/2006/main" xmlns:r="http://schemas.openxmlformats.org/officeDocument/2006/relationships" type="blank" preserve="1">
+<p:sldLayout xmlns:a="http://schemas.openxmlformats.org/drawingml/2006/main" xmlns:r="http://schemas.openxmlformats.org/officeDocument/2006/relationships" xmlns:p="http://schemas.openxmlformats.org/presentationml/2006/main" type="blank" preserve="1">
   <p:cSld name="Blank Slide">
     <p:spTree>
       <p:nvGrpSpPr>
@@ -462,11 +581,14 @@
       </p:grpSpPr>
     </p:spTree>
   </p:cSld>
+  <p:clrMapOvr>
+    <a:masterClrMapping/>
+  </p:clrMapOvr>
 </p:sldLayout>
 </file>
 
 <file path=ppt/slideLayouts/slideLayout14.xml><?xml version="1.0" encoding="utf-8"?>
-<p:sldLayout xmlns:a="http://schemas.openxmlformats.org/drawingml/2006/main" xmlns:p="http://schemas.openxmlformats.org/presentationml/2006/main" xmlns:r="http://schemas.openxmlformats.org/officeDocument/2006/relationships" type="tx" preserve="1">
+<p:sldLayout xmlns:a="http://schemas.openxmlformats.org/drawingml/2006/main" xmlns:r="http://schemas.openxmlformats.org/officeDocument/2006/relationships" xmlns:p="http://schemas.openxmlformats.org/presentationml/2006/main" type="tx" preserve="1">
   <p:cSld name="Title Slide">
     <p:spTree>
       <p:nvGrpSpPr>
@@ -502,7 +624,8 @@
           </a:prstGeom>
         </p:spPr>
         <p:txBody>
-          <a:bodyPr lIns="0" rIns="0" tIns="0" bIns="0" anchor="ctr"/>
+          <a:bodyPr lIns="0" tIns="0" rIns="0" bIns="0" anchor="ctr"/>
+          <a:lstStyle/>
           <a:p>
             <a:endParaRPr/>
           </a:p>
@@ -528,7 +651,8 @@
           </a:prstGeom>
         </p:spPr>
         <p:txBody>
-          <a:bodyPr lIns="0" rIns="0" tIns="0" bIns="0" anchor="ctr"/>
+          <a:bodyPr lIns="0" tIns="0" rIns="0" bIns="0" anchor="ctr"/>
+          <a:lstStyle/>
           <a:p>
             <a:pPr algn="ctr"/>
             <a:endParaRPr/>
@@ -537,11 +661,14 @@
       </p:sp>
     </p:spTree>
   </p:cSld>
+  <p:clrMapOvr>
+    <a:masterClrMapping/>
+  </p:clrMapOvr>
 </p:sldLayout>
 </file>
 
 <file path=ppt/slideLayouts/slideLayout15.xml><?xml version="1.0" encoding="utf-8"?>
-<p:sldLayout xmlns:a="http://schemas.openxmlformats.org/drawingml/2006/main" xmlns:p="http://schemas.openxmlformats.org/presentationml/2006/main" xmlns:r="http://schemas.openxmlformats.org/officeDocument/2006/relationships" type="obj" preserve="1">
+<p:sldLayout xmlns:a="http://schemas.openxmlformats.org/drawingml/2006/main" xmlns:r="http://schemas.openxmlformats.org/officeDocument/2006/relationships" xmlns:p="http://schemas.openxmlformats.org/presentationml/2006/main" type="obj" preserve="1">
   <p:cSld name="Title, Content">
     <p:spTree>
       <p:nvGrpSpPr>
@@ -577,7 +704,8 @@
           </a:prstGeom>
         </p:spPr>
         <p:txBody>
-          <a:bodyPr lIns="0" rIns="0" tIns="0" bIns="0" anchor="ctr"/>
+          <a:bodyPr lIns="0" tIns="0" rIns="0" bIns="0" anchor="ctr"/>
+          <a:lstStyle/>
           <a:p>
             <a:endParaRPr/>
           </a:p>
@@ -603,7 +731,8 @@
           </a:prstGeom>
         </p:spPr>
         <p:txBody>
-          <a:bodyPr lIns="0" rIns="0" tIns="0" bIns="0"/>
+          <a:bodyPr lIns="0" tIns="0" rIns="0" bIns="0"/>
+          <a:lstStyle/>
           <a:p>
             <a:endParaRPr/>
           </a:p>
@@ -611,11 +740,14 @@
       </p:sp>
     </p:spTree>
   </p:cSld>
+  <p:clrMapOvr>
+    <a:masterClrMapping/>
+  </p:clrMapOvr>
 </p:sldLayout>
 </file>
 
 <file path=ppt/slideLayouts/slideLayout16.xml><?xml version="1.0" encoding="utf-8"?>
-<p:sldLayout xmlns:a="http://schemas.openxmlformats.org/drawingml/2006/main" xmlns:p="http://schemas.openxmlformats.org/presentationml/2006/main" xmlns:r="http://schemas.openxmlformats.org/officeDocument/2006/relationships" type="twoObj" preserve="1">
+<p:sldLayout xmlns:a="http://schemas.openxmlformats.org/drawingml/2006/main" xmlns:r="http://schemas.openxmlformats.org/officeDocument/2006/relationships" xmlns:p="http://schemas.openxmlformats.org/presentationml/2006/main" type="twoObj" preserve="1">
   <p:cSld name="Title, 2 Content">
     <p:spTree>
       <p:nvGrpSpPr>
@@ -651,7 +783,8 @@
           </a:prstGeom>
         </p:spPr>
         <p:txBody>
-          <a:bodyPr lIns="0" rIns="0" tIns="0" bIns="0" anchor="ctr"/>
+          <a:bodyPr lIns="0" tIns="0" rIns="0" bIns="0" anchor="ctr"/>
+          <a:lstStyle/>
           <a:p>
             <a:endParaRPr/>
           </a:p>
@@ -677,7 +810,8 @@
           </a:prstGeom>
         </p:spPr>
         <p:txBody>
-          <a:bodyPr lIns="0" rIns="0" tIns="0" bIns="0"/>
+          <a:bodyPr lIns="0" tIns="0" rIns="0" bIns="0"/>
+          <a:lstStyle/>
           <a:p>
             <a:endParaRPr/>
           </a:p>
@@ -703,7 +837,8 @@
           </a:prstGeom>
         </p:spPr>
         <p:txBody>
-          <a:bodyPr lIns="0" rIns="0" tIns="0" bIns="0"/>
+          <a:bodyPr lIns="0" tIns="0" rIns="0" bIns="0"/>
+          <a:lstStyle/>
           <a:p>
             <a:endParaRPr/>
           </a:p>
@@ -711,11 +846,14 @@
       </p:sp>
     </p:spTree>
   </p:cSld>
+  <p:clrMapOvr>
+    <a:masterClrMapping/>
+  </p:clrMapOvr>
 </p:sldLayout>
 </file>
 
 <file path=ppt/slideLayouts/slideLayout17.xml><?xml version="1.0" encoding="utf-8"?>
-<p:sldLayout xmlns:a="http://schemas.openxmlformats.org/drawingml/2006/main" xmlns:p="http://schemas.openxmlformats.org/presentationml/2006/main" xmlns:r="http://schemas.openxmlformats.org/officeDocument/2006/relationships" type="titleOnly" preserve="1">
+<p:sldLayout xmlns:a="http://schemas.openxmlformats.org/drawingml/2006/main" xmlns:r="http://schemas.openxmlformats.org/officeDocument/2006/relationships" xmlns:p="http://schemas.openxmlformats.org/presentationml/2006/main" type="titleOnly" preserve="1">
   <p:cSld name="Title Only">
     <p:spTree>
       <p:nvGrpSpPr>
@@ -751,7 +889,8 @@
           </a:prstGeom>
         </p:spPr>
         <p:txBody>
-          <a:bodyPr lIns="0" rIns="0" tIns="0" bIns="0" anchor="ctr"/>
+          <a:bodyPr lIns="0" tIns="0" rIns="0" bIns="0" anchor="ctr"/>
+          <a:lstStyle/>
           <a:p>
             <a:endParaRPr/>
           </a:p>
@@ -759,11 +898,14 @@
       </p:sp>
     </p:spTree>
   </p:cSld>
+  <p:clrMapOvr>
+    <a:masterClrMapping/>
+  </p:clrMapOvr>
 </p:sldLayout>
 </file>
 
 <file path=ppt/slideLayouts/slideLayout18.xml><?xml version="1.0" encoding="utf-8"?>
-<p:sldLayout xmlns:a="http://schemas.openxmlformats.org/drawingml/2006/main" xmlns:p="http://schemas.openxmlformats.org/presentationml/2006/main" xmlns:r="http://schemas.openxmlformats.org/officeDocument/2006/relationships" type="objOnly" preserve="1">
+<p:sldLayout xmlns:a="http://schemas.openxmlformats.org/drawingml/2006/main" xmlns:r="http://schemas.openxmlformats.org/officeDocument/2006/relationships" xmlns:p="http://schemas.openxmlformats.org/presentationml/2006/main" type="objOnly" preserve="1">
   <p:cSld name="Centered Text">
     <p:spTree>
       <p:nvGrpSpPr>
@@ -799,7 +941,8 @@
           </a:prstGeom>
         </p:spPr>
         <p:txBody>
-          <a:bodyPr lIns="0" rIns="0" tIns="0" bIns="0" anchor="ctr"/>
+          <a:bodyPr lIns="0" tIns="0" rIns="0" bIns="0" anchor="ctr"/>
+          <a:lstStyle/>
           <a:p>
             <a:pPr algn="ctr"/>
             <a:endParaRPr/>
@@ -808,11 +951,14 @@
       </p:sp>
     </p:spTree>
   </p:cSld>
+  <p:clrMapOvr>
+    <a:masterClrMapping/>
+  </p:clrMapOvr>
 </p:sldLayout>
 </file>
 
 <file path=ppt/slideLayouts/slideLayout19.xml><?xml version="1.0" encoding="utf-8"?>
-<p:sldLayout xmlns:a="http://schemas.openxmlformats.org/drawingml/2006/main" xmlns:p="http://schemas.openxmlformats.org/presentationml/2006/main" xmlns:r="http://schemas.openxmlformats.org/officeDocument/2006/relationships" type="twoObjAndObj" preserve="1">
+<p:sldLayout xmlns:a="http://schemas.openxmlformats.org/drawingml/2006/main" xmlns:r="http://schemas.openxmlformats.org/officeDocument/2006/relationships" xmlns:p="http://schemas.openxmlformats.org/presentationml/2006/main" type="twoObjAndObj" preserve="1">
   <p:cSld name="Title, 2 Content and Content">
     <p:spTree>
       <p:nvGrpSpPr>
@@ -848,7 +994,8 @@
           </a:prstGeom>
         </p:spPr>
         <p:txBody>
-          <a:bodyPr lIns="0" rIns="0" tIns="0" bIns="0" anchor="ctr"/>
+          <a:bodyPr lIns="0" tIns="0" rIns="0" bIns="0" anchor="ctr"/>
+          <a:lstStyle/>
           <a:p>
             <a:endParaRPr/>
           </a:p>
@@ -874,7 +1021,8 @@
           </a:prstGeom>
         </p:spPr>
         <p:txBody>
-          <a:bodyPr lIns="0" rIns="0" tIns="0" bIns="0"/>
+          <a:bodyPr lIns="0" tIns="0" rIns="0" bIns="0"/>
+          <a:lstStyle/>
           <a:p>
             <a:endParaRPr/>
           </a:p>
@@ -900,7 +1048,8 @@
           </a:prstGeom>
         </p:spPr>
         <p:txBody>
-          <a:bodyPr lIns="0" rIns="0" tIns="0" bIns="0"/>
+          <a:bodyPr lIns="0" tIns="0" rIns="0" bIns="0"/>
+          <a:lstStyle/>
           <a:p>
             <a:endParaRPr/>
           </a:p>
@@ -926,7 +1075,8 @@
           </a:prstGeom>
         </p:spPr>
         <p:txBody>
-          <a:bodyPr lIns="0" rIns="0" tIns="0" bIns="0"/>
+          <a:bodyPr lIns="0" tIns="0" rIns="0" bIns="0"/>
+          <a:lstStyle/>
           <a:p>
             <a:endParaRPr/>
           </a:p>
@@ -934,11 +1084,14 @@
       </p:sp>
     </p:spTree>
   </p:cSld>
+  <p:clrMapOvr>
+    <a:masterClrMapping/>
+  </p:clrMapOvr>
 </p:sldLayout>
 </file>
 
 <file path=ppt/slideLayouts/slideLayout2.xml><?xml version="1.0" encoding="utf-8"?>
-<p:sldLayout xmlns:a="http://schemas.openxmlformats.org/drawingml/2006/main" xmlns:p="http://schemas.openxmlformats.org/presentationml/2006/main" xmlns:r="http://schemas.openxmlformats.org/officeDocument/2006/relationships" type="tx" preserve="1">
+<p:sldLayout xmlns:a="http://schemas.openxmlformats.org/drawingml/2006/main" xmlns:r="http://schemas.openxmlformats.org/officeDocument/2006/relationships" xmlns:p="http://schemas.openxmlformats.org/presentationml/2006/main" type="tx" preserve="1">
   <p:cSld name="Title Slide">
     <p:spTree>
       <p:nvGrpSpPr>
@@ -974,7 +1127,8 @@
           </a:prstGeom>
         </p:spPr>
         <p:txBody>
-          <a:bodyPr lIns="0" rIns="0" tIns="0" bIns="0" anchor="ctr"/>
+          <a:bodyPr lIns="0" tIns="0" rIns="0" bIns="0" anchor="ctr"/>
+          <a:lstStyle/>
           <a:p>
             <a:endParaRPr/>
           </a:p>
@@ -1000,7 +1154,8 @@
           </a:prstGeom>
         </p:spPr>
         <p:txBody>
-          <a:bodyPr lIns="0" rIns="0" tIns="0" bIns="0" anchor="ctr"/>
+          <a:bodyPr lIns="0" tIns="0" rIns="0" bIns="0" anchor="ctr"/>
+          <a:lstStyle/>
           <a:p>
             <a:pPr algn="ctr"/>
             <a:endParaRPr/>
@@ -1009,11 +1164,14 @@
       </p:sp>
     </p:spTree>
   </p:cSld>
+  <p:clrMapOvr>
+    <a:masterClrMapping/>
+  </p:clrMapOvr>
 </p:sldLayout>
 </file>
 
 <file path=ppt/slideLayouts/slideLayout20.xml><?xml version="1.0" encoding="utf-8"?>
-<p:sldLayout xmlns:a="http://schemas.openxmlformats.org/drawingml/2006/main" xmlns:p="http://schemas.openxmlformats.org/presentationml/2006/main" xmlns:r="http://schemas.openxmlformats.org/officeDocument/2006/relationships" type="objAndTwoObj" preserve="1">
+<p:sldLayout xmlns:a="http://schemas.openxmlformats.org/drawingml/2006/main" xmlns:r="http://schemas.openxmlformats.org/officeDocument/2006/relationships" xmlns:p="http://schemas.openxmlformats.org/presentationml/2006/main" type="objAndTwoObj" preserve="1">
   <p:cSld name="Title Content and 2 Content">
     <p:spTree>
       <p:nvGrpSpPr>
@@ -1049,7 +1207,8 @@
           </a:prstGeom>
         </p:spPr>
         <p:txBody>
-          <a:bodyPr lIns="0" rIns="0" tIns="0" bIns="0" anchor="ctr"/>
+          <a:bodyPr lIns="0" tIns="0" rIns="0" bIns="0" anchor="ctr"/>
+          <a:lstStyle/>
           <a:p>
             <a:endParaRPr/>
           </a:p>
@@ -1075,7 +1234,8 @@
           </a:prstGeom>
         </p:spPr>
         <p:txBody>
-          <a:bodyPr lIns="0" rIns="0" tIns="0" bIns="0"/>
+          <a:bodyPr lIns="0" tIns="0" rIns="0" bIns="0"/>
+          <a:lstStyle/>
           <a:p>
             <a:endParaRPr/>
           </a:p>
@@ -1101,7 +1261,8 @@
           </a:prstGeom>
         </p:spPr>
         <p:txBody>
-          <a:bodyPr lIns="0" rIns="0" tIns="0" bIns="0"/>
+          <a:bodyPr lIns="0" tIns="0" rIns="0" bIns="0"/>
+          <a:lstStyle/>
           <a:p>
             <a:endParaRPr/>
           </a:p>
@@ -1127,7 +1288,8 @@
           </a:prstGeom>
         </p:spPr>
         <p:txBody>
-          <a:bodyPr lIns="0" rIns="0" tIns="0" bIns="0"/>
+          <a:bodyPr lIns="0" tIns="0" rIns="0" bIns="0"/>
+          <a:lstStyle/>
           <a:p>
             <a:endParaRPr/>
           </a:p>
@@ -1135,11 +1297,14 @@
       </p:sp>
     </p:spTree>
   </p:cSld>
+  <p:clrMapOvr>
+    <a:masterClrMapping/>
+  </p:clrMapOvr>
 </p:sldLayout>
 </file>
 
 <file path=ppt/slideLayouts/slideLayout21.xml><?xml version="1.0" encoding="utf-8"?>
-<p:sldLayout xmlns:a="http://schemas.openxmlformats.org/drawingml/2006/main" xmlns:p="http://schemas.openxmlformats.org/presentationml/2006/main" xmlns:r="http://schemas.openxmlformats.org/officeDocument/2006/relationships" type="twoObjOverTx" preserve="1">
+<p:sldLayout xmlns:a="http://schemas.openxmlformats.org/drawingml/2006/main" xmlns:r="http://schemas.openxmlformats.org/officeDocument/2006/relationships" xmlns:p="http://schemas.openxmlformats.org/presentationml/2006/main" type="twoObjOverTx" preserve="1">
   <p:cSld name="Title, 2 Content over Content">
     <p:spTree>
       <p:nvGrpSpPr>
@@ -1175,7 +1340,8 @@
           </a:prstGeom>
         </p:spPr>
         <p:txBody>
-          <a:bodyPr lIns="0" rIns="0" tIns="0" bIns="0" anchor="ctr"/>
+          <a:bodyPr lIns="0" tIns="0" rIns="0" bIns="0" anchor="ctr"/>
+          <a:lstStyle/>
           <a:p>
             <a:endParaRPr/>
           </a:p>
@@ -1201,7 +1367,8 @@
           </a:prstGeom>
         </p:spPr>
         <p:txBody>
-          <a:bodyPr lIns="0" rIns="0" tIns="0" bIns="0"/>
+          <a:bodyPr lIns="0" tIns="0" rIns="0" bIns="0"/>
+          <a:lstStyle/>
           <a:p>
             <a:endParaRPr/>
           </a:p>
@@ -1227,7 +1394,8 @@
           </a:prstGeom>
         </p:spPr>
         <p:txBody>
-          <a:bodyPr lIns="0" rIns="0" tIns="0" bIns="0"/>
+          <a:bodyPr lIns="0" tIns="0" rIns="0" bIns="0"/>
+          <a:lstStyle/>
           <a:p>
             <a:endParaRPr/>
           </a:p>
@@ -1253,7 +1421,8 @@
           </a:prstGeom>
         </p:spPr>
         <p:txBody>
-          <a:bodyPr lIns="0" rIns="0" tIns="0" bIns="0"/>
+          <a:bodyPr lIns="0" tIns="0" rIns="0" bIns="0"/>
+          <a:lstStyle/>
           <a:p>
             <a:endParaRPr/>
           </a:p>
@@ -1261,11 +1430,14 @@
       </p:sp>
     </p:spTree>
   </p:cSld>
+  <p:clrMapOvr>
+    <a:masterClrMapping/>
+  </p:clrMapOvr>
 </p:sldLayout>
 </file>
 
 <file path=ppt/slideLayouts/slideLayout22.xml><?xml version="1.0" encoding="utf-8"?>
-<p:sldLayout xmlns:a="http://schemas.openxmlformats.org/drawingml/2006/main" xmlns:p="http://schemas.openxmlformats.org/presentationml/2006/main" xmlns:r="http://schemas.openxmlformats.org/officeDocument/2006/relationships" type="objOverTx" preserve="1">
+<p:sldLayout xmlns:a="http://schemas.openxmlformats.org/drawingml/2006/main" xmlns:r="http://schemas.openxmlformats.org/officeDocument/2006/relationships" xmlns:p="http://schemas.openxmlformats.org/presentationml/2006/main" type="objOverTx" preserve="1">
   <p:cSld name="Title, Content over Content">
     <p:spTree>
       <p:nvGrpSpPr>
@@ -1301,7 +1473,8 @@
           </a:prstGeom>
         </p:spPr>
         <p:txBody>
-          <a:bodyPr lIns="0" rIns="0" tIns="0" bIns="0" anchor="ctr"/>
+          <a:bodyPr lIns="0" tIns="0" rIns="0" bIns="0" anchor="ctr"/>
+          <a:lstStyle/>
           <a:p>
             <a:endParaRPr/>
           </a:p>
@@ -1327,7 +1500,8 @@
           </a:prstGeom>
         </p:spPr>
         <p:txBody>
-          <a:bodyPr lIns="0" rIns="0" tIns="0" bIns="0"/>
+          <a:bodyPr lIns="0" tIns="0" rIns="0" bIns="0"/>
+          <a:lstStyle/>
           <a:p>
             <a:endParaRPr/>
           </a:p>
@@ -1353,7 +1527,8 @@
           </a:prstGeom>
         </p:spPr>
         <p:txBody>
-          <a:bodyPr lIns="0" rIns="0" tIns="0" bIns="0"/>
+          <a:bodyPr lIns="0" tIns="0" rIns="0" bIns="0"/>
+          <a:lstStyle/>
           <a:p>
             <a:endParaRPr/>
           </a:p>
@@ -1361,11 +1536,14 @@
       </p:sp>
     </p:spTree>
   </p:cSld>
+  <p:clrMapOvr>
+    <a:masterClrMapping/>
+  </p:clrMapOvr>
 </p:sldLayout>
 </file>
 
 <file path=ppt/slideLayouts/slideLayout23.xml><?xml version="1.0" encoding="utf-8"?>
-<p:sldLayout xmlns:a="http://schemas.openxmlformats.org/drawingml/2006/main" xmlns:p="http://schemas.openxmlformats.org/presentationml/2006/main" xmlns:r="http://schemas.openxmlformats.org/officeDocument/2006/relationships" type="fourObj" preserve="1">
+<p:sldLayout xmlns:a="http://schemas.openxmlformats.org/drawingml/2006/main" xmlns:r="http://schemas.openxmlformats.org/officeDocument/2006/relationships" xmlns:p="http://schemas.openxmlformats.org/presentationml/2006/main" type="fourObj" preserve="1">
   <p:cSld name="Title, 4 Content">
     <p:spTree>
       <p:nvGrpSpPr>
@@ -1401,7 +1579,8 @@
           </a:prstGeom>
         </p:spPr>
         <p:txBody>
-          <a:bodyPr lIns="0" rIns="0" tIns="0" bIns="0" anchor="ctr"/>
+          <a:bodyPr lIns="0" tIns="0" rIns="0" bIns="0" anchor="ctr"/>
+          <a:lstStyle/>
           <a:p>
             <a:endParaRPr/>
           </a:p>
@@ -1427,7 +1606,8 @@
           </a:prstGeom>
         </p:spPr>
         <p:txBody>
-          <a:bodyPr lIns="0" rIns="0" tIns="0" bIns="0"/>
+          <a:bodyPr lIns="0" tIns="0" rIns="0" bIns="0"/>
+          <a:lstStyle/>
           <a:p>
             <a:endParaRPr/>
           </a:p>
@@ -1453,7 +1633,8 @@
           </a:prstGeom>
         </p:spPr>
         <p:txBody>
-          <a:bodyPr lIns="0" rIns="0" tIns="0" bIns="0"/>
+          <a:bodyPr lIns="0" tIns="0" rIns="0" bIns="0"/>
+          <a:lstStyle/>
           <a:p>
             <a:endParaRPr/>
           </a:p>
@@ -1479,7 +1660,8 @@
           </a:prstGeom>
         </p:spPr>
         <p:txBody>
-          <a:bodyPr lIns="0" rIns="0" tIns="0" bIns="0"/>
+          <a:bodyPr lIns="0" tIns="0" rIns="0" bIns="0"/>
+          <a:lstStyle/>
           <a:p>
             <a:endParaRPr/>
           </a:p>
@@ -1505,7 +1687,8 @@
           </a:prstGeom>
         </p:spPr>
         <p:txBody>
-          <a:bodyPr lIns="0" rIns="0" tIns="0" bIns="0"/>
+          <a:bodyPr lIns="0" tIns="0" rIns="0" bIns="0"/>
+          <a:lstStyle/>
           <a:p>
             <a:endParaRPr/>
           </a:p>
@@ -1513,11 +1696,14 @@
       </p:sp>
     </p:spTree>
   </p:cSld>
+  <p:clrMapOvr>
+    <a:masterClrMapping/>
+  </p:clrMapOvr>
 </p:sldLayout>
 </file>
 
 <file path=ppt/slideLayouts/slideLayout24.xml><?xml version="1.0" encoding="utf-8"?>
-<p:sldLayout xmlns:a="http://schemas.openxmlformats.org/drawingml/2006/main" xmlns:p="http://schemas.openxmlformats.org/presentationml/2006/main" xmlns:r="http://schemas.openxmlformats.org/officeDocument/2006/relationships" type="blank" preserve="1">
+<p:sldLayout xmlns:a="http://schemas.openxmlformats.org/drawingml/2006/main" xmlns:r="http://schemas.openxmlformats.org/officeDocument/2006/relationships" xmlns:p="http://schemas.openxmlformats.org/presentationml/2006/main" type="blank" preserve="1">
   <p:cSld name="Title, 6 Content">
     <p:spTree>
       <p:nvGrpSpPr>
@@ -1553,7 +1739,8 @@
           </a:prstGeom>
         </p:spPr>
         <p:txBody>
-          <a:bodyPr lIns="0" rIns="0" tIns="0" bIns="0" anchor="ctr"/>
+          <a:bodyPr lIns="0" tIns="0" rIns="0" bIns="0" anchor="ctr"/>
+          <a:lstStyle/>
           <a:p>
             <a:endParaRPr/>
           </a:p>
@@ -1579,7 +1766,8 @@
           </a:prstGeom>
         </p:spPr>
         <p:txBody>
-          <a:bodyPr lIns="0" rIns="0" tIns="0" bIns="0"/>
+          <a:bodyPr lIns="0" tIns="0" rIns="0" bIns="0"/>
+          <a:lstStyle/>
           <a:p>
             <a:endParaRPr/>
           </a:p>
@@ -1605,7 +1793,8 @@
           </a:prstGeom>
         </p:spPr>
         <p:txBody>
-          <a:bodyPr lIns="0" rIns="0" tIns="0" bIns="0"/>
+          <a:bodyPr lIns="0" tIns="0" rIns="0" bIns="0"/>
+          <a:lstStyle/>
           <a:p>
             <a:endParaRPr/>
           </a:p>
@@ -1613,7 +1802,7 @@
       </p:sp>
       <p:pic>
         <p:nvPicPr>
-          <p:cNvPr id="82" name="" descr=""/>
+          <p:cNvPr id="82" name="Picture 81"/>
           <p:cNvPicPr/>
           <p:nvPr/>
         </p:nvPicPr>
@@ -1636,12 +1825,12 @@
       </p:pic>
       <p:pic>
         <p:nvPicPr>
-          <p:cNvPr id="83" name="" descr=""/>
+          <p:cNvPr id="83" name="Picture 82"/>
           <p:cNvPicPr/>
           <p:nvPr/>
         </p:nvPicPr>
         <p:blipFill>
-          <a:blip r:embed="rId3"/>
+          <a:blip r:embed="rId2"/>
           <a:stretch/>
         </p:blipFill>
         <p:spPr>
@@ -1659,11 +1848,14 @@
       </p:pic>
     </p:spTree>
   </p:cSld>
+  <p:clrMapOvr>
+    <a:masterClrMapping/>
+  </p:clrMapOvr>
 </p:sldLayout>
 </file>
 
 <file path=ppt/slideLayouts/slideLayout3.xml><?xml version="1.0" encoding="utf-8"?>
-<p:sldLayout xmlns:a="http://schemas.openxmlformats.org/drawingml/2006/main" xmlns:p="http://schemas.openxmlformats.org/presentationml/2006/main" xmlns:r="http://schemas.openxmlformats.org/officeDocument/2006/relationships" type="obj" preserve="1">
+<p:sldLayout xmlns:a="http://schemas.openxmlformats.org/drawingml/2006/main" xmlns:r="http://schemas.openxmlformats.org/officeDocument/2006/relationships" xmlns:p="http://schemas.openxmlformats.org/presentationml/2006/main" type="obj" preserve="1">
   <p:cSld name="Title, Content">
     <p:spTree>
       <p:nvGrpSpPr>
@@ -1699,7 +1891,8 @@
           </a:prstGeom>
         </p:spPr>
         <p:txBody>
-          <a:bodyPr lIns="0" rIns="0" tIns="0" bIns="0" anchor="ctr"/>
+          <a:bodyPr lIns="0" tIns="0" rIns="0" bIns="0" anchor="ctr"/>
+          <a:lstStyle/>
           <a:p>
             <a:endParaRPr/>
           </a:p>
@@ -1725,7 +1918,8 @@
           </a:prstGeom>
         </p:spPr>
         <p:txBody>
-          <a:bodyPr lIns="0" rIns="0" tIns="0" bIns="0"/>
+          <a:bodyPr lIns="0" tIns="0" rIns="0" bIns="0"/>
+          <a:lstStyle/>
           <a:p>
             <a:endParaRPr/>
           </a:p>
@@ -1733,11 +1927,14 @@
       </p:sp>
     </p:spTree>
   </p:cSld>
+  <p:clrMapOvr>
+    <a:masterClrMapping/>
+  </p:clrMapOvr>
 </p:sldLayout>
 </file>
 
 <file path=ppt/slideLayouts/slideLayout4.xml><?xml version="1.0" encoding="utf-8"?>
-<p:sldLayout xmlns:a="http://schemas.openxmlformats.org/drawingml/2006/main" xmlns:p="http://schemas.openxmlformats.org/presentationml/2006/main" xmlns:r="http://schemas.openxmlformats.org/officeDocument/2006/relationships" type="twoObj" preserve="1">
+<p:sldLayout xmlns:a="http://schemas.openxmlformats.org/drawingml/2006/main" xmlns:r="http://schemas.openxmlformats.org/officeDocument/2006/relationships" xmlns:p="http://schemas.openxmlformats.org/presentationml/2006/main" type="twoObj" preserve="1">
   <p:cSld name="Title, 2 Content">
     <p:spTree>
       <p:nvGrpSpPr>
@@ -1773,7 +1970,8 @@
           </a:prstGeom>
         </p:spPr>
         <p:txBody>
-          <a:bodyPr lIns="0" rIns="0" tIns="0" bIns="0" anchor="ctr"/>
+          <a:bodyPr lIns="0" tIns="0" rIns="0" bIns="0" anchor="ctr"/>
+          <a:lstStyle/>
           <a:p>
             <a:endParaRPr/>
           </a:p>
@@ -1799,7 +1997,8 @@
           </a:prstGeom>
         </p:spPr>
         <p:txBody>
-          <a:bodyPr lIns="0" rIns="0" tIns="0" bIns="0"/>
+          <a:bodyPr lIns="0" tIns="0" rIns="0" bIns="0"/>
+          <a:lstStyle/>
           <a:p>
             <a:endParaRPr/>
           </a:p>
@@ -1825,7 +2024,8 @@
           </a:prstGeom>
         </p:spPr>
         <p:txBody>
-          <a:bodyPr lIns="0" rIns="0" tIns="0" bIns="0"/>
+          <a:bodyPr lIns="0" tIns="0" rIns="0" bIns="0"/>
+          <a:lstStyle/>
           <a:p>
             <a:endParaRPr/>
           </a:p>
@@ -1833,11 +2033,14 @@
       </p:sp>
     </p:spTree>
   </p:cSld>
+  <p:clrMapOvr>
+    <a:masterClrMapping/>
+  </p:clrMapOvr>
 </p:sldLayout>
 </file>
 
 <file path=ppt/slideLayouts/slideLayout5.xml><?xml version="1.0" encoding="utf-8"?>
-<p:sldLayout xmlns:a="http://schemas.openxmlformats.org/drawingml/2006/main" xmlns:p="http://schemas.openxmlformats.org/presentationml/2006/main" xmlns:r="http://schemas.openxmlformats.org/officeDocument/2006/relationships" type="titleOnly" preserve="1">
+<p:sldLayout xmlns:a="http://schemas.openxmlformats.org/drawingml/2006/main" xmlns:r="http://schemas.openxmlformats.org/officeDocument/2006/relationships" xmlns:p="http://schemas.openxmlformats.org/presentationml/2006/main" type="titleOnly" preserve="1">
   <p:cSld name="Title Only">
     <p:spTree>
       <p:nvGrpSpPr>
@@ -1873,7 +2076,8 @@
           </a:prstGeom>
         </p:spPr>
         <p:txBody>
-          <a:bodyPr lIns="0" rIns="0" tIns="0" bIns="0" anchor="ctr"/>
+          <a:bodyPr lIns="0" tIns="0" rIns="0" bIns="0" anchor="ctr"/>
+          <a:lstStyle/>
           <a:p>
             <a:endParaRPr/>
           </a:p>
@@ -1881,11 +2085,14 @@
       </p:sp>
     </p:spTree>
   </p:cSld>
+  <p:clrMapOvr>
+    <a:masterClrMapping/>
+  </p:clrMapOvr>
 </p:sldLayout>
 </file>
 
 <file path=ppt/slideLayouts/slideLayout6.xml><?xml version="1.0" encoding="utf-8"?>
-<p:sldLayout xmlns:a="http://schemas.openxmlformats.org/drawingml/2006/main" xmlns:p="http://schemas.openxmlformats.org/presentationml/2006/main" xmlns:r="http://schemas.openxmlformats.org/officeDocument/2006/relationships" type="objOnly" preserve="1">
+<p:sldLayout xmlns:a="http://schemas.openxmlformats.org/drawingml/2006/main" xmlns:r="http://schemas.openxmlformats.org/officeDocument/2006/relationships" xmlns:p="http://schemas.openxmlformats.org/presentationml/2006/main" type="objOnly" preserve="1">
   <p:cSld name="Centered Text">
     <p:spTree>
       <p:nvGrpSpPr>
@@ -1921,7 +2128,8 @@
           </a:prstGeom>
         </p:spPr>
         <p:txBody>
-          <a:bodyPr lIns="0" rIns="0" tIns="0" bIns="0" anchor="ctr"/>
+          <a:bodyPr lIns="0" tIns="0" rIns="0" bIns="0" anchor="ctr"/>
+          <a:lstStyle/>
           <a:p>
             <a:pPr algn="ctr"/>
             <a:endParaRPr/>
@@ -1930,11 +2138,14 @@
       </p:sp>
     </p:spTree>
   </p:cSld>
+  <p:clrMapOvr>
+    <a:masterClrMapping/>
+  </p:clrMapOvr>
 </p:sldLayout>
 </file>
 
 <file path=ppt/slideLayouts/slideLayout7.xml><?xml version="1.0" encoding="utf-8"?>
-<p:sldLayout xmlns:a="http://schemas.openxmlformats.org/drawingml/2006/main" xmlns:p="http://schemas.openxmlformats.org/presentationml/2006/main" xmlns:r="http://schemas.openxmlformats.org/officeDocument/2006/relationships" type="twoObjAndObj" preserve="1">
+<p:sldLayout xmlns:a="http://schemas.openxmlformats.org/drawingml/2006/main" xmlns:r="http://schemas.openxmlformats.org/officeDocument/2006/relationships" xmlns:p="http://schemas.openxmlformats.org/presentationml/2006/main" type="twoObjAndObj" preserve="1">
   <p:cSld name="Title, 2 Content and Content">
     <p:spTree>
       <p:nvGrpSpPr>
@@ -1970,7 +2181,8 @@
           </a:prstGeom>
         </p:spPr>
         <p:txBody>
-          <a:bodyPr lIns="0" rIns="0" tIns="0" bIns="0" anchor="ctr"/>
+          <a:bodyPr lIns="0" tIns="0" rIns="0" bIns="0" anchor="ctr"/>
+          <a:lstStyle/>
           <a:p>
             <a:endParaRPr/>
           </a:p>
@@ -1996,7 +2208,8 @@
           </a:prstGeom>
         </p:spPr>
         <p:txBody>
-          <a:bodyPr lIns="0" rIns="0" tIns="0" bIns="0"/>
+          <a:bodyPr lIns="0" tIns="0" rIns="0" bIns="0"/>
+          <a:lstStyle/>
           <a:p>
             <a:endParaRPr/>
           </a:p>
@@ -2022,7 +2235,8 @@
           </a:prstGeom>
         </p:spPr>
         <p:txBody>
-          <a:bodyPr lIns="0" rIns="0" tIns="0" bIns="0"/>
+          <a:bodyPr lIns="0" tIns="0" rIns="0" bIns="0"/>
+          <a:lstStyle/>
           <a:p>
             <a:endParaRPr/>
           </a:p>
@@ -2048,7 +2262,8 @@
           </a:prstGeom>
         </p:spPr>
         <p:txBody>
-          <a:bodyPr lIns="0" rIns="0" tIns="0" bIns="0"/>
+          <a:bodyPr lIns="0" tIns="0" rIns="0" bIns="0"/>
+          <a:lstStyle/>
           <a:p>
             <a:endParaRPr/>
           </a:p>
@@ -2056,11 +2271,14 @@
       </p:sp>
     </p:spTree>
   </p:cSld>
+  <p:clrMapOvr>
+    <a:masterClrMapping/>
+  </p:clrMapOvr>
 </p:sldLayout>
 </file>
 
 <file path=ppt/slideLayouts/slideLayout8.xml><?xml version="1.0" encoding="utf-8"?>
-<p:sldLayout xmlns:a="http://schemas.openxmlformats.org/drawingml/2006/main" xmlns:p="http://schemas.openxmlformats.org/presentationml/2006/main" xmlns:r="http://schemas.openxmlformats.org/officeDocument/2006/relationships" type="objAndTwoObj" preserve="1">
+<p:sldLayout xmlns:a="http://schemas.openxmlformats.org/drawingml/2006/main" xmlns:r="http://schemas.openxmlformats.org/officeDocument/2006/relationships" xmlns:p="http://schemas.openxmlformats.org/presentationml/2006/main" type="objAndTwoObj" preserve="1">
   <p:cSld name="Title Content and 2 Content">
     <p:spTree>
       <p:nvGrpSpPr>
@@ -2096,7 +2314,8 @@
           </a:prstGeom>
         </p:spPr>
         <p:txBody>
-          <a:bodyPr lIns="0" rIns="0" tIns="0" bIns="0" anchor="ctr"/>
+          <a:bodyPr lIns="0" tIns="0" rIns="0" bIns="0" anchor="ctr"/>
+          <a:lstStyle/>
           <a:p>
             <a:endParaRPr/>
           </a:p>
@@ -2122,7 +2341,8 @@
           </a:prstGeom>
         </p:spPr>
         <p:txBody>
-          <a:bodyPr lIns="0" rIns="0" tIns="0" bIns="0"/>
+          <a:bodyPr lIns="0" tIns="0" rIns="0" bIns="0"/>
+          <a:lstStyle/>
           <a:p>
             <a:endParaRPr/>
           </a:p>
@@ -2148,7 +2368,8 @@
           </a:prstGeom>
         </p:spPr>
         <p:txBody>
-          <a:bodyPr lIns="0" rIns="0" tIns="0" bIns="0"/>
+          <a:bodyPr lIns="0" tIns="0" rIns="0" bIns="0"/>
+          <a:lstStyle/>
           <a:p>
             <a:endParaRPr/>
           </a:p>
@@ -2174,7 +2395,8 @@
           </a:prstGeom>
         </p:spPr>
         <p:txBody>
-          <a:bodyPr lIns="0" rIns="0" tIns="0" bIns="0"/>
+          <a:bodyPr lIns="0" tIns="0" rIns="0" bIns="0"/>
+          <a:lstStyle/>
           <a:p>
             <a:endParaRPr/>
           </a:p>
@@ -2182,11 +2404,14 @@
       </p:sp>
     </p:spTree>
   </p:cSld>
+  <p:clrMapOvr>
+    <a:masterClrMapping/>
+  </p:clrMapOvr>
 </p:sldLayout>
 </file>
 
 <file path=ppt/slideLayouts/slideLayout9.xml><?xml version="1.0" encoding="utf-8"?>
-<p:sldLayout xmlns:a="http://schemas.openxmlformats.org/drawingml/2006/main" xmlns:p="http://schemas.openxmlformats.org/presentationml/2006/main" xmlns:r="http://schemas.openxmlformats.org/officeDocument/2006/relationships" type="twoObjOverTx" preserve="1">
+<p:sldLayout xmlns:a="http://schemas.openxmlformats.org/drawingml/2006/main" xmlns:r="http://schemas.openxmlformats.org/officeDocument/2006/relationships" xmlns:p="http://schemas.openxmlformats.org/presentationml/2006/main" type="twoObjOverTx" preserve="1">
   <p:cSld name="Title, 2 Content over Content">
     <p:spTree>
       <p:nvGrpSpPr>
@@ -2222,7 +2447,8 @@
           </a:prstGeom>
         </p:spPr>
         <p:txBody>
-          <a:bodyPr lIns="0" rIns="0" tIns="0" bIns="0" anchor="ctr"/>
+          <a:bodyPr lIns="0" tIns="0" rIns="0" bIns="0" anchor="ctr"/>
+          <a:lstStyle/>
           <a:p>
             <a:endParaRPr/>
           </a:p>
@@ -2248,7 +2474,8 @@
           </a:prstGeom>
         </p:spPr>
         <p:txBody>
-          <a:bodyPr lIns="0" rIns="0" tIns="0" bIns="0"/>
+          <a:bodyPr lIns="0" tIns="0" rIns="0" bIns="0"/>
+          <a:lstStyle/>
           <a:p>
             <a:endParaRPr/>
           </a:p>
@@ -2274,7 +2501,8 @@
           </a:prstGeom>
         </p:spPr>
         <p:txBody>
-          <a:bodyPr lIns="0" rIns="0" tIns="0" bIns="0"/>
+          <a:bodyPr lIns="0" tIns="0" rIns="0" bIns="0"/>
+          <a:lstStyle/>
           <a:p>
             <a:endParaRPr/>
           </a:p>
@@ -2300,7 +2528,8 @@
           </a:prstGeom>
         </p:spPr>
         <p:txBody>
-          <a:bodyPr lIns="0" rIns="0" tIns="0" bIns="0"/>
+          <a:bodyPr lIns="0" tIns="0" rIns="0" bIns="0"/>
+          <a:lstStyle/>
           <a:p>
             <a:endParaRPr/>
           </a:p>
@@ -2308,12 +2537,20 @@
       </p:sp>
     </p:spTree>
   </p:cSld>
+  <p:clrMapOvr>
+    <a:masterClrMapping/>
+  </p:clrMapOvr>
 </p:sldLayout>
 </file>
 
 <file path=ppt/slideMasters/slideMaster1.xml><?xml version="1.0" encoding="utf-8"?>
-<p:sldMaster xmlns:a="http://schemas.openxmlformats.org/drawingml/2006/main" xmlns:p="http://schemas.openxmlformats.org/presentationml/2006/main" xmlns:r="http://schemas.openxmlformats.org/officeDocument/2006/relationships">
+<p:sldMaster xmlns:a="http://schemas.openxmlformats.org/drawingml/2006/main" xmlns:r="http://schemas.openxmlformats.org/officeDocument/2006/relationships" xmlns:p="http://schemas.openxmlformats.org/presentationml/2006/main">
   <p:cSld>
+    <p:bg>
+      <p:bgRef idx="1001">
+        <a:schemeClr val="bg1"/>
+      </p:bgRef>
+    </p:bg>
     <p:spTree>
       <p:nvGrpSpPr>
         <p:cNvPr id="1" name=""/>
@@ -2330,7 +2567,7 @@
       </p:grpSpPr>
       <p:sp>
         <p:nvSpPr>
-          <p:cNvPr id="0" name="CustomShape 1"/>
+          <p:cNvPr id="9" name="CustomShape 1"/>
           <p:cNvSpPr/>
           <p:nvPr/>
         </p:nvSpPr>
@@ -2343,13 +2580,13 @@
             <a:avLst/>
           </a:prstGeom>
           <a:solidFill>
-            <a:srgbClr val="ffffff"/>
+            <a:srgbClr val="FFFFFF"/>
           </a:solidFill>
           <a:ln>
             <a:noFill/>
           </a:ln>
           <a:effectLst>
-            <a:outerShdw algn="tl" blurRad="31750" dir="5400000" dist="10160" rotWithShape="0">
+            <a:outerShdw blurRad="31750" dist="10160" dir="5400000" algn="tl" rotWithShape="0">
               <a:srgbClr val="000000">
                 <a:alpha val="60000"/>
               </a:srgbClr>
@@ -2371,7 +2608,7 @@
       </p:sp>
       <p:sp>
         <p:nvSpPr>
-          <p:cNvPr id="1" name="CustomShape 2"/>
+          <p:cNvPr id="10" name="CustomShape 2"/>
           <p:cNvSpPr/>
           <p:nvPr/>
         </p:nvSpPr>
@@ -2457,7 +2694,8 @@
           </a:prstGeom>
         </p:spPr>
         <p:txBody>
-          <a:bodyPr rIns="45720" tIns="0" bIns="0"/>
+          <a:bodyPr tIns="0" rIns="45720" bIns="0"/>
+          <a:lstStyle/>
           <a:p>
             <a:pPr>
               <a:lnSpc>
@@ -2465,9 +2703,9 @@
               </a:lnSpc>
             </a:pPr>
             <a:r>
-              <a:rPr b="1" lang="en-US" sz="4700" strike="noStrike">
-                <a:solidFill>
-                  <a:srgbClr val="f0ad00"/>
+              <a:rPr lang="en-US" sz="4700" b="1" strike="noStrike">
+                <a:solidFill>
+                  <a:srgbClr val="F0AD00"/>
                 </a:solidFill>
                 <a:latin typeface="Corbel"/>
               </a:rPr>
@@ -2497,7 +2735,8 @@
           </a:prstGeom>
         </p:spPr>
         <p:txBody>
-          <a:bodyPr lIns="109800" rIns="45720" tIns="45000" bIns="0" anchor="b"/>
+          <a:bodyPr lIns="109800" tIns="45000" rIns="45720" bIns="0" anchor="b"/>
+          <a:lstStyle/>
           <a:p>
             <a:pPr>
               <a:lnSpc>
@@ -2507,7 +2746,7 @@
             <a:r>
               <a:rPr lang="en-US" sz="1200" strike="noStrike">
                 <a:solidFill>
-                  <a:srgbClr val="ffffff"/>
+                  <a:srgbClr val="FFFFFF"/>
                 </a:solidFill>
                 <a:latin typeface="Corbel"/>
               </a:rPr>
@@ -2537,7 +2776,8 @@
           </a:prstGeom>
         </p:spPr>
         <p:txBody>
-          <a:bodyPr lIns="45720" rIns="45720" tIns="45000" bIns="0" anchor="b"/>
+          <a:bodyPr lIns="45720" tIns="45000" rIns="45720" bIns="0" anchor="b"/>
+          <a:lstStyle/>
           <a:p>
             <a:endParaRPr/>
           </a:p>
@@ -2563,7 +2803,8 @@
           </a:prstGeom>
         </p:spPr>
         <p:txBody>
-          <a:bodyPr lIns="90000" rIns="90000" tIns="45000" bIns="0" anchor="b"/>
+          <a:bodyPr lIns="90000" tIns="45000" rIns="90000" bIns="0" anchor="b"/>
+          <a:lstStyle/>
           <a:p>
             <a:pPr algn="r">
               <a:lnSpc>
@@ -2573,11 +2814,11 @@
             <a:fld id="{4155B5D2-306C-456F-843F-E70DF218B903}" type="slidenum">
               <a:rPr lang="en-US" sz="1200" strike="noStrike">
                 <a:solidFill>
-                  <a:srgbClr val="ffffff"/>
-                </a:solidFill>
-                <a:latin typeface="Corbel"/>
-              </a:rPr>
-              <a:t>&lt;number&gt;</a:t>
+                  <a:srgbClr val="FFFFFF"/>
+                </a:solidFill>
+                <a:latin typeface="Corbel"/>
+              </a:rPr>
+              <a:t>‹#›</a:t>
             </a:fld>
             <a:endParaRPr/>
           </a:p>
@@ -2598,13 +2839,13 @@
             <a:avLst/>
           </a:prstGeom>
           <a:solidFill>
-            <a:srgbClr val="ffffff"/>
+            <a:srgbClr val="FFFFFF"/>
           </a:solidFill>
           <a:ln>
             <a:noFill/>
           </a:ln>
           <a:effectLst>
-            <a:outerShdw algn="tl" blurRad="31750" dir="5400000" dist="10160" rotWithShape="0">
+            <a:outerShdw blurRad="31750" dist="10160" dir="5400000" algn="tl" rotWithShape="0">
               <a:srgbClr val="000000">
                 <a:alpha val="60000"/>
               </a:srgbClr>
@@ -2644,7 +2885,8 @@
           </a:prstGeom>
         </p:spPr>
         <p:txBody>
-          <a:bodyPr lIns="0" rIns="0" tIns="0" bIns="0"/>
+          <a:bodyPr lIns="0" tIns="0" rIns="0" bIns="0"/>
+          <a:lstStyle/>
           <a:p>
             <a:pPr>
               <a:buSzPct val="45000"/>
@@ -2747,32 +2989,38 @@
       </p:sp>
     </p:spTree>
   </p:cSld>
-  <p:clrMap bg1="lt1" bg2="lt2" tx1="dk1" tx2="dk2" accent1="accent1" accent2="accent2" accent3="accent3" accent4="accent4" accent5="accent5" accent6="accent6" hlink="hlink" folHlink="folHlink"/>
+  <p:clrMap bg1="lt1" tx1="dk1" bg2="lt2" tx2="dk2" accent1="accent1" accent2="accent2" accent3="accent3" accent4="accent4" accent5="accent5" accent6="accent6" hlink="hlink" folHlink="folHlink"/>
   <p:sldLayoutIdLst>
-    <p:sldLayoutId id="2147483649" r:id="rId2"/>
-    <p:sldLayoutId id="2147483650" r:id="rId3"/>
-    <p:sldLayoutId id="2147483651" r:id="rId4"/>
-    <p:sldLayoutId id="2147483652" r:id="rId5"/>
-    <p:sldLayoutId id="2147483653" r:id="rId6"/>
-    <p:sldLayoutId id="2147483654" r:id="rId7"/>
-    <p:sldLayoutId id="2147483655" r:id="rId8"/>
-    <p:sldLayoutId id="2147483656" r:id="rId9"/>
-    <p:sldLayoutId id="2147483657" r:id="rId10"/>
-    <p:sldLayoutId id="2147483658" r:id="rId11"/>
-    <p:sldLayoutId id="2147483659" r:id="rId12"/>
-    <p:sldLayoutId id="2147483660" r:id="rId13"/>
+    <p:sldLayoutId id="2147483649" r:id="rId1"/>
+    <p:sldLayoutId id="2147483650" r:id="rId2"/>
+    <p:sldLayoutId id="2147483651" r:id="rId3"/>
+    <p:sldLayoutId id="2147483652" r:id="rId4"/>
+    <p:sldLayoutId id="2147483653" r:id="rId5"/>
+    <p:sldLayoutId id="2147483654" r:id="rId6"/>
+    <p:sldLayoutId id="2147483655" r:id="rId7"/>
+    <p:sldLayoutId id="2147483656" r:id="rId8"/>
+    <p:sldLayoutId id="2147483657" r:id="rId9"/>
+    <p:sldLayoutId id="2147483658" r:id="rId10"/>
+    <p:sldLayoutId id="2147483659" r:id="rId11"/>
+    <p:sldLayoutId id="2147483660" r:id="rId12"/>
   </p:sldLayoutIdLst>
+  <p:txStyles>
+    <p:titleStyle/>
+    <p:bodyStyle/>
+    <p:otherStyle/>
+  </p:txStyles>
 </p:sldMaster>
 </file>
 
 <file path=ppt/slideMasters/slideMaster2.xml><?xml version="1.0" encoding="utf-8"?>
-<p:sldMaster xmlns:a="http://schemas.openxmlformats.org/drawingml/2006/main" xmlns:p="http://schemas.openxmlformats.org/presentationml/2006/main" xmlns:r="http://schemas.openxmlformats.org/officeDocument/2006/relationships">
+<p:sldMaster xmlns:a="http://schemas.openxmlformats.org/drawingml/2006/main" xmlns:r="http://schemas.openxmlformats.org/officeDocument/2006/relationships" xmlns:p="http://schemas.openxmlformats.org/presentationml/2006/main">
   <p:cSld>
     <p:bg>
       <p:bgPr>
         <a:solidFill>
-          <a:srgbClr val="ffffff"/>
+          <a:srgbClr val="FFFFFF"/>
         </a:solidFill>
+        <a:effectLst/>
       </p:bgPr>
     </p:bg>
     <p:spTree>
@@ -2804,13 +3052,13 @@
             <a:avLst/>
           </a:prstGeom>
           <a:solidFill>
-            <a:srgbClr val="ffffff"/>
+            <a:srgbClr val="FFFFFF"/>
           </a:solidFill>
           <a:ln>
             <a:noFill/>
           </a:ln>
           <a:effectLst>
-            <a:outerShdw algn="tl" blurRad="31750" dir="5400000" dist="10160" rotWithShape="0">
+            <a:outerShdw blurRad="31750" dist="10160" dir="5400000" algn="tl" rotWithShape="0">
               <a:srgbClr val="000000">
                 <a:alpha val="60000"/>
               </a:srgbClr>
@@ -2884,7 +3132,8 @@
           </a:prstGeom>
         </p:spPr>
         <p:txBody>
-          <a:bodyPr rIns="45720" tIns="45000" bIns="45000" anchor="ctr"/>
+          <a:bodyPr tIns="45000" rIns="45720" bIns="45000" anchor="ctr"/>
+          <a:lstStyle/>
           <a:p>
             <a:pPr>
               <a:lnSpc>
@@ -2892,9 +3141,9 @@
               </a:lnSpc>
             </a:pPr>
             <a:r>
-              <a:rPr b="1" lang="en-US" sz="4500" strike="noStrike">
-                <a:solidFill>
-                  <a:srgbClr val="f0ad00"/>
+              <a:rPr lang="en-US" sz="4500" b="1" strike="noStrike">
+                <a:solidFill>
+                  <a:srgbClr val="F0AD00"/>
                 </a:solidFill>
                 <a:latin typeface="Corbel"/>
               </a:rPr>
@@ -2924,7 +3173,8 @@
           </a:prstGeom>
         </p:spPr>
         <p:txBody>
-          <a:bodyPr lIns="54720" rIns="90000" tIns="91440" bIns="45000"/>
+          <a:bodyPr lIns="54720" tIns="91440" rIns="90000" bIns="45000"/>
+          <a:lstStyle/>
           <a:p>
             <a:pPr>
               <a:buSzPct val="45000"/>
@@ -3146,7 +3396,8 @@
           </a:prstGeom>
         </p:spPr>
         <p:txBody>
-          <a:bodyPr lIns="109800" rIns="45720" tIns="45000" bIns="0" anchor="b"/>
+          <a:bodyPr lIns="109800" tIns="45000" rIns="45720" bIns="0" anchor="b"/>
+          <a:lstStyle/>
           <a:p>
             <a:pPr>
               <a:lnSpc>
@@ -3186,7 +3437,8 @@
           </a:prstGeom>
         </p:spPr>
         <p:txBody>
-          <a:bodyPr lIns="45720" rIns="45720" tIns="45000" bIns="0" anchor="b"/>
+          <a:bodyPr lIns="45720" tIns="45000" rIns="45720" bIns="0" anchor="b"/>
+          <a:lstStyle/>
           <a:p>
             <a:endParaRPr/>
           </a:p>
@@ -3212,7 +3464,8 @@
           </a:prstGeom>
         </p:spPr>
         <p:txBody>
-          <a:bodyPr lIns="90000" rIns="90000" tIns="45000" bIns="0" anchor="b"/>
+          <a:bodyPr lIns="90000" tIns="45000" rIns="90000" bIns="0" anchor="b"/>
+          <a:lstStyle/>
           <a:p>
             <a:pPr algn="r">
               <a:lnSpc>
@@ -3226,7 +3479,7 @@
                 </a:solidFill>
                 <a:latin typeface="Corbel"/>
               </a:rPr>
-              <a:t>&lt;number&gt;</a:t>
+              <a:t>‹#›</a:t>
             </a:fld>
             <a:endParaRPr/>
           </a:p>
@@ -3234,26 +3487,31 @@
       </p:sp>
     </p:spTree>
   </p:cSld>
-  <p:clrMap bg1="lt1" bg2="lt2" tx1="dk1" tx2="dk2" accent1="accent1" accent2="accent2" accent3="accent3" accent4="accent4" accent5="accent5" accent6="accent6" hlink="hlink" folHlink="folHlink"/>
+  <p:clrMap bg1="lt1" tx1="dk1" bg2="lt2" tx2="dk2" accent1="accent1" accent2="accent2" accent3="accent3" accent4="accent4" accent5="accent5" accent6="accent6" hlink="hlink" folHlink="folHlink"/>
   <p:sldLayoutIdLst>
-    <p:sldLayoutId id="2147483662" r:id="rId2"/>
-    <p:sldLayoutId id="2147483663" r:id="rId3"/>
-    <p:sldLayoutId id="2147483664" r:id="rId4"/>
-    <p:sldLayoutId id="2147483665" r:id="rId5"/>
-    <p:sldLayoutId id="2147483666" r:id="rId6"/>
-    <p:sldLayoutId id="2147483667" r:id="rId7"/>
-    <p:sldLayoutId id="2147483668" r:id="rId8"/>
-    <p:sldLayoutId id="2147483669" r:id="rId9"/>
-    <p:sldLayoutId id="2147483670" r:id="rId10"/>
-    <p:sldLayoutId id="2147483671" r:id="rId11"/>
-    <p:sldLayoutId id="2147483672" r:id="rId12"/>
-    <p:sldLayoutId id="2147483673" r:id="rId13"/>
+    <p:sldLayoutId id="2147483662" r:id="rId1"/>
+    <p:sldLayoutId id="2147483663" r:id="rId2"/>
+    <p:sldLayoutId id="2147483664" r:id="rId3"/>
+    <p:sldLayoutId id="2147483665" r:id="rId4"/>
+    <p:sldLayoutId id="2147483666" r:id="rId5"/>
+    <p:sldLayoutId id="2147483667" r:id="rId6"/>
+    <p:sldLayoutId id="2147483668" r:id="rId7"/>
+    <p:sldLayoutId id="2147483669" r:id="rId8"/>
+    <p:sldLayoutId id="2147483670" r:id="rId9"/>
+    <p:sldLayoutId id="2147483671" r:id="rId10"/>
+    <p:sldLayoutId id="2147483672" r:id="rId11"/>
+    <p:sldLayoutId id="2147483673" r:id="rId12"/>
   </p:sldLayoutIdLst>
+  <p:txStyles>
+    <p:titleStyle/>
+    <p:bodyStyle/>
+    <p:otherStyle/>
+  </p:txStyles>
 </p:sldMaster>
 </file>
 
 <file path=ppt/slides/slide1.xml><?xml version="1.0" encoding="utf-8"?>
-<p:sld xmlns:a="http://schemas.openxmlformats.org/drawingml/2006/main" xmlns:p="http://schemas.openxmlformats.org/presentationml/2006/main" xmlns:r="http://schemas.openxmlformats.org/officeDocument/2006/relationships">
+<p:sld xmlns:a="http://schemas.openxmlformats.org/drawingml/2006/main" xmlns:r="http://schemas.openxmlformats.org/officeDocument/2006/relationships" xmlns:p="http://schemas.openxmlformats.org/presentationml/2006/main">
   <p:cSld>
     <p:spTree>
       <p:nvGrpSpPr>
@@ -3289,7 +3547,8 @@
           </a:ln>
         </p:spPr>
         <p:txBody>
-          <a:bodyPr rIns="45720" tIns="0" bIns="0"/>
+          <a:bodyPr tIns="0" rIns="45720" bIns="0"/>
+          <a:lstStyle/>
           <a:p>
             <a:pPr algn="ctr">
               <a:lnSpc>
@@ -3297,9 +3556,9 @@
               </a:lnSpc>
             </a:pPr>
             <a:r>
-              <a:rPr b="1" lang="en-US" sz="8800" strike="noStrike">
-                <a:solidFill>
-                  <a:srgbClr val="f0ad00"/>
+              <a:rPr lang="en-US" sz="8800" b="1" strike="noStrike">
+                <a:solidFill>
+                  <a:srgbClr val="F0AD00"/>
                 </a:solidFill>
                 <a:latin typeface="Corbel"/>
               </a:rPr>
@@ -3329,7 +3588,8 @@
           </a:ln>
         </p:spPr>
         <p:txBody>
-          <a:bodyPr lIns="118800" rIns="45720" tIns="0" bIns="0" anchor="b"/>
+          <a:bodyPr lIns="118800" tIns="0" rIns="45720" bIns="0" anchor="b"/>
+          <a:lstStyle/>
           <a:p>
             <a:pPr>
               <a:lnSpc>
@@ -3339,7 +3599,7 @@
             <a:r>
               <a:rPr lang="en-US" sz="2000" strike="noStrike">
                 <a:solidFill>
-                  <a:srgbClr val="ffffff"/>
+                  <a:srgbClr val="FFFFFF"/>
                 </a:solidFill>
                 <a:latin typeface="Corbel"/>
               </a:rPr>
@@ -3348,7 +3608,7 @@
             <a:r>
               <a:rPr lang="en-US" sz="2800" strike="noStrike">
                 <a:solidFill>
-                  <a:srgbClr val="ffffff"/>
+                  <a:srgbClr val="FFFFFF"/>
                 </a:solidFill>
                 <a:latin typeface="Corbel"/>
               </a:rPr>
@@ -3357,7 +3617,7 @@
             <a:r>
               <a:rPr lang="en-US" sz="2000" strike="noStrike">
                 <a:solidFill>
-                  <a:srgbClr val="ffffff"/>
+                  <a:srgbClr val="FFFFFF"/>
                 </a:solidFill>
                 <a:latin typeface="Corbel"/>
               </a:rPr>
@@ -3370,6 +3630,9 @@
       </p:sp>
     </p:spTree>
   </p:cSld>
+  <p:clrMapOvr>
+    <a:masterClrMapping/>
+  </p:clrMapOvr>
   <p:timing>
     <p:tnLst>
       <p:par>
@@ -3378,14 +3641,14 @@
             <p:seq>
               <p:cTn id="2" nodeType="mainSeq"/>
               <p:prevCondLst>
-                <p:cond delay="0" evt="onPrev">
+                <p:cond evt="onPrev" delay="0">
                   <p:tgtEl>
                     <p:sldTgt/>
                   </p:tgtEl>
                 </p:cond>
               </p:prevCondLst>
               <p:nextCondLst>
-                <p:cond delay="0" evt="onNext">
+                <p:cond evt="onNext" delay="0">
                   <p:tgtEl>
                     <p:sldTgt/>
                   </p:tgtEl>
@@ -3401,7 +3664,7 @@
 </file>
 
 <file path=ppt/slides/slide10.xml><?xml version="1.0" encoding="utf-8"?>
-<p:sld xmlns:a="http://schemas.openxmlformats.org/drawingml/2006/main" xmlns:p="http://schemas.openxmlformats.org/presentationml/2006/main" xmlns:r="http://schemas.openxmlformats.org/officeDocument/2006/relationships">
+<p:sld xmlns:a="http://schemas.openxmlformats.org/drawingml/2006/main" xmlns:r="http://schemas.openxmlformats.org/officeDocument/2006/relationships" xmlns:p="http://schemas.openxmlformats.org/presentationml/2006/main">
   <p:cSld>
     <p:spTree>
       <p:nvGrpSpPr>
@@ -3419,7 +3682,7 @@
       </p:grpSpPr>
       <p:sp>
         <p:nvSpPr>
-          <p:cNvPr id="102" name="TextShape 1"/>
+          <p:cNvPr id="100" name="TextShape 1"/>
           <p:cNvSpPr txBox="1"/>
           <p:nvPr/>
         </p:nvSpPr>
@@ -3437,7 +3700,8 @@
           </a:ln>
         </p:spPr>
         <p:txBody>
-          <a:bodyPr rIns="45720" tIns="45000" bIns="45000" anchor="ctr"/>
+          <a:bodyPr tIns="45000" rIns="45720" bIns="45000" anchor="ctr"/>
+          <a:lstStyle/>
           <a:p>
             <a:pPr algn="ctr">
               <a:lnSpc>
@@ -3445,27 +3709,27 @@
               </a:lnSpc>
             </a:pPr>
             <a:r>
-              <a:rPr b="1" lang="en-US" sz="4500" strike="noStrike">
-                <a:solidFill>
-                  <a:srgbClr val="f0ad00"/>
-                </a:solidFill>
-                <a:latin typeface="Corbel"/>
-              </a:rPr>
-              <a:t>Solutions</a:t>
-            </a:r>
-            <a:endParaRPr/>
-          </a:p>
-        </p:txBody>
-      </p:sp>
-      <p:sp>
-        <p:nvSpPr>
-          <p:cNvPr id="103" name="TextShape 2"/>
+              <a:rPr lang="en-US" sz="4500" b="1" strike="noStrike">
+                <a:solidFill>
+                  <a:srgbClr val="F0AD00"/>
+                </a:solidFill>
+                <a:latin typeface="Corbel"/>
+              </a:rPr>
+              <a:t>Challenges faced with Mid-level</a:t>
+            </a:r>
+            <a:endParaRPr/>
+          </a:p>
+        </p:txBody>
+      </p:sp>
+      <p:sp>
+        <p:nvSpPr>
+          <p:cNvPr id="101" name="TextShape 2"/>
           <p:cNvSpPr txBox="1"/>
           <p:nvPr/>
         </p:nvSpPr>
         <p:spPr>
           <a:xfrm>
-            <a:off x="365760" y="1775160"/>
+            <a:off x="457200" y="1775160"/>
             <a:ext cx="8229240" cy="4625280"/>
           </a:xfrm>
           <a:prstGeom prst="rect">
@@ -3477,7 +3741,8 @@
           </a:ln>
         </p:spPr>
         <p:txBody>
-          <a:bodyPr lIns="54720" rIns="90000" tIns="91440" bIns="45000"/>
+          <a:bodyPr lIns="54720" tIns="91440" rIns="90000" bIns="45000"/>
+          <a:lstStyle/>
           <a:p>
             <a:pPr>
               <a:lnSpc>
@@ -3488,15 +3753,23 @@
               <a:buChar char=""/>
             </a:pPr>
             <a:r>
-              <a:rPr lang="en-US" sz="3200" strike="noStrike">
+              <a:rPr lang="en-US" sz="3200" strike="noStrike" dirty="0">
                 <a:solidFill>
                   <a:srgbClr val="000000"/>
                 </a:solidFill>
                 <a:latin typeface="Corbel"/>
               </a:rPr>
-              <a:t>Got help from Lecton</a:t>
-            </a:r>
-            <a:endParaRPr/>
+              <a:t>Time pleasure</a:t>
+            </a:r>
+            <a:endParaRPr dirty="0"/>
+          </a:p>
+          <a:p>
+            <a:pPr>
+              <a:lnSpc>
+                <a:spcPct val="100000"/>
+              </a:lnSpc>
+            </a:pPr>
+            <a:endParaRPr dirty="0"/>
           </a:p>
           <a:p>
             <a:pPr>
@@ -3508,15 +3781,24 @@
               <a:buChar char=""/>
             </a:pPr>
             <a:r>
-              <a:rPr lang="en-US" sz="3200" strike="noStrike">
+              <a:rPr lang="en-US" sz="3200" strike="noStrike" dirty="0">
                 <a:solidFill>
                   <a:srgbClr val="000000"/>
                 </a:solidFill>
                 <a:latin typeface="Corbel"/>
               </a:rPr>
-              <a:t>In the end we managed a partial work around by passing callback functions into our functions which then handle the data we retrieve from LDAP</a:t>
-            </a:r>
-            <a:endParaRPr/>
+              <a:t>Impossible to meet demands, ask for information that we could not retrieve from LDAP</a:t>
+            </a:r>
+            <a:endParaRPr dirty="0"/>
+          </a:p>
+          <a:p>
+            <a:pPr>
+              <a:lnSpc>
+                <a:spcPct val="100000"/>
+              </a:lnSpc>
+              <a:buSzPct val="80000"/>
+            </a:pPr>
+            <a:endParaRPr dirty="0"/>
           </a:p>
           <a:p>
             <a:pPr>
@@ -3524,7 +3806,7 @@
                 <a:spcPct val="100000"/>
               </a:lnSpc>
             </a:pPr>
-            <a:endParaRPr/>
+            <a:endParaRPr dirty="0"/>
           </a:p>
           <a:p>
             <a:pPr>
@@ -3532,28 +3814,31 @@
                 <a:spcPct val="100000"/>
               </a:lnSpc>
             </a:pPr>
-            <a:endParaRPr/>
+            <a:endParaRPr dirty="0"/>
           </a:p>
         </p:txBody>
       </p:sp>
     </p:spTree>
   </p:cSld>
+  <p:clrMapOvr>
+    <a:masterClrMapping/>
+  </p:clrMapOvr>
   <p:timing>
     <p:tnLst>
       <p:par>
-        <p:cTn id="19" dur="indefinite" restart="never" nodeType="tmRoot">
+        <p:cTn id="1" dur="indefinite" restart="never" nodeType="tmRoot">
           <p:childTnLst>
             <p:seq>
-              <p:cTn id="20" nodeType="mainSeq"/>
+              <p:cTn id="2" nodeType="mainSeq"/>
               <p:prevCondLst>
-                <p:cond delay="0" evt="onPrev">
+                <p:cond evt="onPrev" delay="0">
                   <p:tgtEl>
                     <p:sldTgt/>
                   </p:tgtEl>
                 </p:cond>
               </p:prevCondLst>
               <p:nextCondLst>
-                <p:cond delay="0" evt="onNext">
+                <p:cond evt="onNext" delay="0">
                   <p:tgtEl>
                     <p:sldTgt/>
                   </p:tgtEl>
@@ -3569,7 +3854,7 @@
 </file>
 
 <file path=ppt/slides/slide11.xml><?xml version="1.0" encoding="utf-8"?>
-<p:sld xmlns:a="http://schemas.openxmlformats.org/drawingml/2006/main" xmlns:p="http://schemas.openxmlformats.org/presentationml/2006/main" xmlns:r="http://schemas.openxmlformats.org/officeDocument/2006/relationships">
+<p:sld xmlns:a="http://schemas.openxmlformats.org/drawingml/2006/main" xmlns:r="http://schemas.openxmlformats.org/officeDocument/2006/relationships" xmlns:p="http://schemas.openxmlformats.org/presentationml/2006/main">
   <p:cSld>
     <p:spTree>
       <p:nvGrpSpPr>
@@ -3587,7 +3872,7 @@
       </p:grpSpPr>
       <p:sp>
         <p:nvSpPr>
-          <p:cNvPr id="104" name="TextShape 1"/>
+          <p:cNvPr id="102" name="TextShape 1"/>
           <p:cNvSpPr txBox="1"/>
           <p:nvPr/>
         </p:nvSpPr>
@@ -3605,7 +3890,8 @@
           </a:ln>
         </p:spPr>
         <p:txBody>
-          <a:bodyPr rIns="45720" tIns="45000" bIns="45000" anchor="ctr"/>
+          <a:bodyPr tIns="45000" rIns="45720" bIns="45000" anchor="ctr"/>
+          <a:lstStyle/>
           <a:p>
             <a:pPr algn="ctr">
               <a:lnSpc>
@@ -3613,36 +3899,27 @@
               </a:lnSpc>
             </a:pPr>
             <a:r>
-              <a:rPr b="1" lang="en-US" sz="4500" strike="noStrike">
-                <a:solidFill>
-                  <a:srgbClr val="f0ad00"/>
-                </a:solidFill>
-                <a:latin typeface="Corbel"/>
-              </a:rPr>
-              <a:t> </a:t>
-            </a:r>
-            <a:r>
-              <a:rPr b="1" lang="en-US" sz="4500" strike="noStrike">
-                <a:solidFill>
-                  <a:srgbClr val="f0ad00"/>
-                </a:solidFill>
-                <a:latin typeface="Corbel"/>
-              </a:rPr>
-              <a:t>What we learned</a:t>
-            </a:r>
-            <a:endParaRPr/>
-          </a:p>
-        </p:txBody>
-      </p:sp>
-      <p:sp>
-        <p:nvSpPr>
-          <p:cNvPr id="105" name="TextShape 2"/>
+              <a:rPr lang="en-US" sz="4500" b="1" strike="noStrike">
+                <a:solidFill>
+                  <a:srgbClr val="F0AD00"/>
+                </a:solidFill>
+                <a:latin typeface="Corbel"/>
+              </a:rPr>
+              <a:t>Solutions</a:t>
+            </a:r>
+            <a:endParaRPr/>
+          </a:p>
+        </p:txBody>
+      </p:sp>
+      <p:sp>
+        <p:nvSpPr>
+          <p:cNvPr id="103" name="TextShape 2"/>
           <p:cNvSpPr txBox="1"/>
           <p:nvPr/>
         </p:nvSpPr>
         <p:spPr>
           <a:xfrm>
-            <a:off x="457200" y="1775160"/>
+            <a:off x="365760" y="1775160"/>
             <a:ext cx="8229240" cy="4625280"/>
           </a:xfrm>
           <a:prstGeom prst="rect">
@@ -3654,7 +3931,8 @@
           </a:ln>
         </p:spPr>
         <p:txBody>
-          <a:bodyPr lIns="54720" rIns="90000" tIns="91440" bIns="45000"/>
+          <a:bodyPr lIns="54720" tIns="91440" rIns="90000" bIns="45000"/>
+          <a:lstStyle/>
           <a:p>
             <a:pPr>
               <a:lnSpc>
@@ -3671,7 +3949,7 @@
                 </a:solidFill>
                 <a:latin typeface="Corbel"/>
               </a:rPr>
-              <a:t>Team work is crucial</a:t>
+              <a:t>Got help from Lecton</a:t>
             </a:r>
             <a:endParaRPr/>
           </a:p>
@@ -3691,10 +3969,143 @@
                 </a:solidFill>
                 <a:latin typeface="Corbel"/>
               </a:rPr>
-              <a:t>Dependency injection is best</a:t>
-            </a:r>
-            <a:endParaRPr/>
-          </a:p>
+              <a:t>In the end we managed a partial work around by passing callback functions into our functions which then handle the data we retrieve from LDAP</a:t>
+            </a:r>
+            <a:endParaRPr/>
+          </a:p>
+          <a:p>
+            <a:pPr>
+              <a:lnSpc>
+                <a:spcPct val="100000"/>
+              </a:lnSpc>
+            </a:pPr>
+            <a:endParaRPr/>
+          </a:p>
+          <a:p>
+            <a:pPr>
+              <a:lnSpc>
+                <a:spcPct val="100000"/>
+              </a:lnSpc>
+            </a:pPr>
+            <a:endParaRPr/>
+          </a:p>
+        </p:txBody>
+      </p:sp>
+    </p:spTree>
+  </p:cSld>
+  <p:clrMapOvr>
+    <a:masterClrMapping/>
+  </p:clrMapOvr>
+  <p:timing>
+    <p:tnLst>
+      <p:par>
+        <p:cTn id="1" dur="indefinite" restart="never" nodeType="tmRoot">
+          <p:childTnLst>
+            <p:seq>
+              <p:cTn id="2" nodeType="mainSeq"/>
+              <p:prevCondLst>
+                <p:cond evt="onPrev" delay="0">
+                  <p:tgtEl>
+                    <p:sldTgt/>
+                  </p:tgtEl>
+                </p:cond>
+              </p:prevCondLst>
+              <p:nextCondLst>
+                <p:cond evt="onNext" delay="0">
+                  <p:tgtEl>
+                    <p:sldTgt/>
+                  </p:tgtEl>
+                </p:cond>
+              </p:nextCondLst>
+            </p:seq>
+          </p:childTnLst>
+        </p:cTn>
+      </p:par>
+    </p:tnLst>
+  </p:timing>
+</p:sld>
+</file>
+
+<file path=ppt/slides/slide12.xml><?xml version="1.0" encoding="utf-8"?>
+<p:sld xmlns:a="http://schemas.openxmlformats.org/drawingml/2006/main" xmlns:r="http://schemas.openxmlformats.org/officeDocument/2006/relationships" xmlns:p="http://schemas.openxmlformats.org/presentationml/2006/main">
+  <p:cSld>
+    <p:spTree>
+      <p:nvGrpSpPr>
+        <p:cNvPr id="1" name=""/>
+        <p:cNvGrpSpPr/>
+        <p:nvPr/>
+      </p:nvGrpSpPr>
+      <p:grpSpPr>
+        <a:xfrm>
+          <a:off x="0" y="0"/>
+          <a:ext cx="0" cy="0"/>
+          <a:chOff x="0" y="0"/>
+          <a:chExt cx="0" cy="0"/>
+        </a:xfrm>
+      </p:grpSpPr>
+      <p:sp>
+        <p:nvSpPr>
+          <p:cNvPr id="104" name="TextShape 1"/>
+          <p:cNvSpPr txBox="1"/>
+          <p:nvPr/>
+        </p:nvSpPr>
+        <p:spPr>
+          <a:xfrm>
+            <a:off x="457200" y="155520"/>
+            <a:ext cx="8229240" cy="1252440"/>
+          </a:xfrm>
+          <a:prstGeom prst="rect">
+            <a:avLst/>
+          </a:prstGeom>
+          <a:noFill/>
+          <a:ln>
+            <a:noFill/>
+          </a:ln>
+        </p:spPr>
+        <p:txBody>
+          <a:bodyPr tIns="45000" rIns="45720" bIns="45000" anchor="ctr"/>
+          <a:lstStyle/>
+          <a:p>
+            <a:pPr algn="ctr">
+              <a:lnSpc>
+                <a:spcPct val="100000"/>
+              </a:lnSpc>
+            </a:pPr>
+            <a:r>
+              <a:rPr lang="en-US" sz="4500" b="1" strike="noStrike">
+                <a:solidFill>
+                  <a:srgbClr val="F0AD00"/>
+                </a:solidFill>
+                <a:latin typeface="Corbel"/>
+              </a:rPr>
+              <a:t> What we learned</a:t>
+            </a:r>
+            <a:endParaRPr/>
+          </a:p>
+        </p:txBody>
+      </p:sp>
+      <p:sp>
+        <p:nvSpPr>
+          <p:cNvPr id="105" name="TextShape 2"/>
+          <p:cNvSpPr txBox="1"/>
+          <p:nvPr/>
+        </p:nvSpPr>
+        <p:spPr>
+          <a:xfrm>
+            <a:off x="457200" y="1758958"/>
+            <a:ext cx="8229240" cy="4625280"/>
+          </a:xfrm>
+          <a:prstGeom prst="rect">
+            <a:avLst/>
+          </a:prstGeom>
+          <a:noFill/>
+          <a:ln>
+            <a:noFill/>
+          </a:ln>
+        </p:spPr>
+        <p:txBody>
+          <a:bodyPr lIns="54720" tIns="91440" rIns="90000" bIns="45000"/>
+          <a:lstStyle/>
           <a:p>
             <a:pPr>
               <a:lnSpc>
@@ -3711,7 +4122,7 @@
                 </a:solidFill>
                 <a:latin typeface="Corbel"/>
               </a:rPr>
-              <a:t>Time management is very important</a:t>
+              <a:t>Team work is crucial</a:t>
             </a:r>
             <a:endParaRPr/>
           </a:p>
@@ -3731,6 +4142,46 @@
                 </a:solidFill>
                 <a:latin typeface="Corbel"/>
               </a:rPr>
+              <a:t>Dependency injection is best</a:t>
+            </a:r>
+            <a:endParaRPr/>
+          </a:p>
+          <a:p>
+            <a:pPr>
+              <a:lnSpc>
+                <a:spcPct val="100000"/>
+              </a:lnSpc>
+              <a:buSzPct val="80000"/>
+              <a:buFont typeface="Wingdings 2" charset="2"/>
+              <a:buChar char=""/>
+            </a:pPr>
+            <a:r>
+              <a:rPr lang="en-US" sz="3200" strike="noStrike">
+                <a:solidFill>
+                  <a:srgbClr val="000000"/>
+                </a:solidFill>
+                <a:latin typeface="Corbel"/>
+              </a:rPr>
+              <a:t>Time management is very important</a:t>
+            </a:r>
+            <a:endParaRPr/>
+          </a:p>
+          <a:p>
+            <a:pPr>
+              <a:lnSpc>
+                <a:spcPct val="100000"/>
+              </a:lnSpc>
+              <a:buSzPct val="80000"/>
+              <a:buFont typeface="Wingdings 2" charset="2"/>
+              <a:buChar char=""/>
+            </a:pPr>
+            <a:r>
+              <a:rPr lang="en-US" sz="3200" strike="noStrike">
+                <a:solidFill>
+                  <a:srgbClr val="000000"/>
+                </a:solidFill>
+                <a:latin typeface="Corbel"/>
+              </a:rPr>
               <a:t>Breakdown in communication results in unproductive use of time and thus communication is crucial</a:t>
             </a:r>
             <a:endParaRPr/>
@@ -3739,22 +4190,25 @@
       </p:sp>
     </p:spTree>
   </p:cSld>
+  <p:clrMapOvr>
+    <a:masterClrMapping/>
+  </p:clrMapOvr>
   <p:timing>
     <p:tnLst>
       <p:par>
-        <p:cTn id="21" dur="indefinite" restart="never" nodeType="tmRoot">
+        <p:cTn id="1" dur="indefinite" restart="never" nodeType="tmRoot">
           <p:childTnLst>
             <p:seq>
-              <p:cTn id="22" nodeType="mainSeq"/>
+              <p:cTn id="2" nodeType="mainSeq"/>
               <p:prevCondLst>
-                <p:cond delay="0" evt="onPrev">
+                <p:cond evt="onPrev" delay="0">
                   <p:tgtEl>
                     <p:sldTgt/>
                   </p:tgtEl>
                 </p:cond>
               </p:prevCondLst>
               <p:nextCondLst>
-                <p:cond delay="0" evt="onNext">
+                <p:cond evt="onNext" delay="0">
                   <p:tgtEl>
                     <p:sldTgt/>
                   </p:tgtEl>
@@ -3770,7 +4224,7 @@
 </file>
 
 <file path=ppt/slides/slide2.xml><?xml version="1.0" encoding="utf-8"?>
-<p:sld xmlns:a="http://schemas.openxmlformats.org/drawingml/2006/main" xmlns:p="http://schemas.openxmlformats.org/presentationml/2006/main" xmlns:r="http://schemas.openxmlformats.org/officeDocument/2006/relationships">
+<p:sld xmlns:a="http://schemas.openxmlformats.org/drawingml/2006/main" xmlns:r="http://schemas.openxmlformats.org/officeDocument/2006/relationships" xmlns:p="http://schemas.openxmlformats.org/presentationml/2006/main">
   <p:cSld>
     <p:spTree>
       <p:nvGrpSpPr>
@@ -3806,7 +4260,8 @@
           </a:ln>
         </p:spPr>
         <p:txBody>
-          <a:bodyPr rIns="45720" tIns="45000" bIns="45000" anchor="ctr"/>
+          <a:bodyPr tIns="45000" rIns="45720" bIns="45000" anchor="ctr"/>
+          <a:lstStyle/>
           <a:p>
             <a:pPr algn="ctr">
               <a:lnSpc>
@@ -3814,9 +4269,9 @@
               </a:lnSpc>
             </a:pPr>
             <a:r>
-              <a:rPr b="1" lang="en-US" sz="4500" strike="noStrike">
-                <a:solidFill>
-                  <a:srgbClr val="f0ad00"/>
+              <a:rPr lang="en-US" sz="4500" b="1" strike="noStrike">
+                <a:solidFill>
+                  <a:srgbClr val="F0AD00"/>
                 </a:solidFill>
                 <a:latin typeface="Corbel"/>
               </a:rPr>
@@ -3846,7 +4301,8 @@
           </a:ln>
         </p:spPr>
         <p:txBody>
-          <a:bodyPr lIns="54720" rIns="90000" tIns="91440" bIns="45000"/>
+          <a:bodyPr lIns="54720" tIns="91440" rIns="90000" bIns="45000"/>
+          <a:lstStyle/>
           <a:p>
             <a:pPr>
               <a:lnSpc>
@@ -3955,22 +4411,25 @@
       </p:sp>
     </p:spTree>
   </p:cSld>
+  <p:clrMapOvr>
+    <a:masterClrMapping/>
+  </p:clrMapOvr>
   <p:timing>
     <p:tnLst>
       <p:par>
-        <p:cTn id="3" dur="indefinite" restart="never" nodeType="tmRoot">
+        <p:cTn id="1" dur="indefinite" restart="never" nodeType="tmRoot">
           <p:childTnLst>
             <p:seq>
-              <p:cTn id="4" nodeType="mainSeq"/>
+              <p:cTn id="2" nodeType="mainSeq"/>
               <p:prevCondLst>
-                <p:cond delay="0" evt="onPrev">
+                <p:cond evt="onPrev" delay="0">
                   <p:tgtEl>
                     <p:sldTgt/>
                   </p:tgtEl>
                 </p:cond>
               </p:prevCondLst>
               <p:nextCondLst>
-                <p:cond delay="0" evt="onNext">
+                <p:cond evt="onNext" delay="0">
                   <p:tgtEl>
                     <p:sldTgt/>
                   </p:tgtEl>
@@ -3986,7 +4445,7 @@
 </file>
 
 <file path=ppt/slides/slide3.xml><?xml version="1.0" encoding="utf-8"?>
-<p:sld xmlns:a="http://schemas.openxmlformats.org/drawingml/2006/main" xmlns:p="http://schemas.openxmlformats.org/presentationml/2006/main" xmlns:r="http://schemas.openxmlformats.org/officeDocument/2006/relationships">
+<p:sld xmlns:a="http://schemas.openxmlformats.org/drawingml/2006/main" xmlns:r="http://schemas.openxmlformats.org/officeDocument/2006/relationships" xmlns:p="http://schemas.openxmlformats.org/presentationml/2006/main">
   <p:cSld>
     <p:spTree>
       <p:nvGrpSpPr>
@@ -4022,7 +4481,8 @@
           </a:ln>
         </p:spPr>
         <p:txBody>
-          <a:bodyPr rIns="45720" tIns="45000" bIns="45000" anchor="ctr"/>
+          <a:bodyPr tIns="45000" rIns="45720" bIns="45000" anchor="ctr"/>
+          <a:lstStyle/>
           <a:p>
             <a:pPr algn="ctr">
               <a:lnSpc>
@@ -4030,24 +4490,33 @@
               </a:lnSpc>
             </a:pPr>
             <a:r>
-              <a:rPr b="1" lang="en-US" sz="4500" strike="noStrike">
-                <a:solidFill>
-                  <a:srgbClr val="f0ad00"/>
-                </a:solidFill>
-                <a:latin typeface="Corbel"/>
-              </a:rPr>
-              <a:t>     </a:t>
-            </a:r>
-            <a:r>
-              <a:rPr b="1" lang="en-US" sz="4500" strike="noStrike">
-                <a:solidFill>
-                  <a:srgbClr val="f0ad00"/>
-                </a:solidFill>
-                <a:latin typeface="Corbel"/>
-              </a:rPr>
-              <a:t>Code &amp; Results: 1 </a:t>
-            </a:r>
-            <a:endParaRPr/>
+              <a:rPr lang="en-US" sz="4500" b="1" strike="noStrike" dirty="0">
+                <a:solidFill>
+                  <a:srgbClr val="F0AD00"/>
+                </a:solidFill>
+                <a:latin typeface="Corbel"/>
+              </a:rPr>
+              <a:t>     Code &amp; Results: </a:t>
+            </a:r>
+            <a:r>
+              <a:rPr lang="en-US" sz="4500" b="1" strike="noStrike" dirty="0" err="1" smtClean="0">
+                <a:solidFill>
+                  <a:srgbClr val="F0AD00"/>
+                </a:solidFill>
+                <a:latin typeface="Corbel"/>
+              </a:rPr>
+              <a:t>findUser</a:t>
+            </a:r>
+            <a:r>
+              <a:rPr lang="en-US" sz="4500" b="1" strike="noStrike" dirty="0" smtClean="0">
+                <a:solidFill>
+                  <a:srgbClr val="F0AD00"/>
+                </a:solidFill>
+                <a:latin typeface="Corbel"/>
+              </a:rPr>
+              <a:t> </a:t>
+            </a:r>
+            <a:endParaRPr dirty="0"/>
           </a:p>
         </p:txBody>
       </p:sp>
@@ -4071,7 +4540,8 @@
           </a:ln>
         </p:spPr>
         <p:txBody>
-          <a:bodyPr lIns="54720" rIns="90000" tIns="91440" bIns="45000"/>
+          <a:bodyPr lIns="54720" tIns="91440" rIns="90000" bIns="45000"/>
+          <a:lstStyle/>
           <a:p>
             <a:pPr>
               <a:lnSpc>
@@ -4094,24 +4564,109 @@
           </a:p>
         </p:txBody>
       </p:sp>
+      <p:pic>
+        <p:nvPicPr>
+          <p:cNvPr id="1026" name="Picture 2" descr="C:\Users\Waliko\Desktop\findUserModules.png"/>
+          <p:cNvPicPr>
+            <a:picLocks noChangeAspect="1" noChangeArrowheads="1"/>
+          </p:cNvPicPr>
+          <p:nvPr/>
+        </p:nvPicPr>
+        <p:blipFill>
+          <a:blip r:embed="rId2">
+            <a:extLst>
+              <a:ext uri="{28A0092B-C50C-407E-A947-70E740481C1C}">
+                <a14:useLocalDpi xmlns:a14="http://schemas.microsoft.com/office/drawing/2010/main" val="0"/>
+              </a:ext>
+            </a:extLst>
+          </a:blip>
+          <a:srcRect/>
+          <a:stretch>
+            <a:fillRect/>
+          </a:stretch>
+        </p:blipFill>
+        <p:spPr bwMode="auto">
+          <a:xfrm>
+            <a:off x="457200" y="1601188"/>
+            <a:ext cx="4897388" cy="4799252"/>
+          </a:xfrm>
+          <a:prstGeom prst="rect">
+            <a:avLst/>
+          </a:prstGeom>
+          <a:noFill/>
+          <a:extLst>
+            <a:ext uri="{909E8E84-426E-40DD-AFC4-6F175D3DCCD1}">
+              <a14:hiddenFill xmlns:a14="http://schemas.microsoft.com/office/drawing/2010/main">
+                <a:solidFill>
+                  <a:srgbClr val="FFFFFF"/>
+                </a:solidFill>
+              </a14:hiddenFill>
+            </a:ext>
+          </a:extLst>
+        </p:spPr>
+      </p:pic>
+      <p:pic>
+        <p:nvPicPr>
+          <p:cNvPr id="1027" name="Picture 3" descr="E:\pic\findUserModules_output.png"/>
+          <p:cNvPicPr>
+            <a:picLocks noChangeAspect="1" noChangeArrowheads="1"/>
+          </p:cNvPicPr>
+          <p:nvPr/>
+        </p:nvPicPr>
+        <p:blipFill>
+          <a:blip r:embed="rId3">
+            <a:extLst>
+              <a:ext uri="{28A0092B-C50C-407E-A947-70E740481C1C}">
+                <a14:useLocalDpi xmlns:a14="http://schemas.microsoft.com/office/drawing/2010/main" val="0"/>
+              </a:ext>
+            </a:extLst>
+          </a:blip>
+          <a:srcRect/>
+          <a:stretch>
+            <a:fillRect/>
+          </a:stretch>
+        </p:blipFill>
+        <p:spPr bwMode="auto">
+          <a:xfrm>
+            <a:off x="5084763" y="3341687"/>
+            <a:ext cx="3819810" cy="1383457"/>
+          </a:xfrm>
+          <a:prstGeom prst="rect">
+            <a:avLst/>
+          </a:prstGeom>
+          <a:noFill/>
+          <a:extLst>
+            <a:ext uri="{909E8E84-426E-40DD-AFC4-6F175D3DCCD1}">
+              <a14:hiddenFill xmlns:a14="http://schemas.microsoft.com/office/drawing/2010/main">
+                <a:solidFill>
+                  <a:srgbClr val="FFFFFF"/>
+                </a:solidFill>
+              </a14:hiddenFill>
+            </a:ext>
+          </a:extLst>
+        </p:spPr>
+      </p:pic>
     </p:spTree>
   </p:cSld>
+  <p:clrMapOvr>
+    <a:masterClrMapping/>
+  </p:clrMapOvr>
   <p:timing>
     <p:tnLst>
       <p:par>
-        <p:cTn id="5" dur="indefinite" restart="never" nodeType="tmRoot">
+        <p:cTn id="1" dur="indefinite" restart="never" nodeType="tmRoot">
           <p:childTnLst>
             <p:seq>
-              <p:cTn id="6" nodeType="mainSeq"/>
+              <p:cTn id="2" nodeType="mainSeq"/>
               <p:prevCondLst>
-                <p:cond delay="0" evt="onPrev">
+                <p:cond evt="onPrev" delay="0">
                   <p:tgtEl>
                     <p:sldTgt/>
                   </p:tgtEl>
                 </p:cond>
               </p:prevCondLst>
               <p:nextCondLst>
-                <p:cond delay="0" evt="onNext">
+                <p:cond evt="onNext" delay="0">
                   <p:tgtEl>
                     <p:sldTgt/>
                   </p:tgtEl>
@@ -4127,7 +4682,7 @@
 </file>
 
 <file path=ppt/slides/slide4.xml><?xml version="1.0" encoding="utf-8"?>
-<p:sld xmlns:a="http://schemas.openxmlformats.org/drawingml/2006/main" xmlns:p="http://schemas.openxmlformats.org/presentationml/2006/main" xmlns:r="http://schemas.openxmlformats.org/officeDocument/2006/relationships">
+<p:sld xmlns:a="http://schemas.openxmlformats.org/drawingml/2006/main" xmlns:r="http://schemas.openxmlformats.org/officeDocument/2006/relationships" xmlns:p="http://schemas.openxmlformats.org/presentationml/2006/main">
   <p:cSld>
     <p:spTree>
       <p:nvGrpSpPr>
@@ -4145,113 +4700,168 @@
       </p:grpSpPr>
       <p:sp>
         <p:nvSpPr>
-          <p:cNvPr id="90" name="TextShape 1"/>
-          <p:cNvSpPr txBox="1"/>
+          <p:cNvPr id="2" name="Title 1"/>
+          <p:cNvSpPr>
+            <a:spLocks noGrp="1"/>
+          </p:cNvSpPr>
+          <p:nvPr>
+            <p:ph type="title"/>
+          </p:nvPr>
+        </p:nvSpPr>
+        <p:spPr/>
+        <p:txBody>
+          <a:bodyPr/>
+          <a:lstStyle/>
+          <a:p>
+            <a:pPr algn="ctr"/>
+            <a:r>
+              <a:rPr lang="en-ZA" dirty="0" smtClean="0"/>
+              <a:t>C</a:t>
+            </a:r>
+            <a:r>
+              <a:rPr lang="en-US" sz="4400" b="1" strike="noStrike" dirty="0" smtClean="0">
+                <a:solidFill>
+                  <a:srgbClr val="F0AD00"/>
+                </a:solidFill>
+                <a:latin typeface="Corbel"/>
+              </a:rPr>
+              <a:t>Code &amp; Results: </a:t>
+            </a:r>
+            <a:r>
+              <a:rPr lang="en-US" sz="4400" b="1" dirty="0" err="1" smtClean="0">
+                <a:solidFill>
+                  <a:srgbClr val="F0AD00"/>
+                </a:solidFill>
+                <a:latin typeface="Corbel"/>
+              </a:rPr>
+              <a:t>GetEmail</a:t>
+            </a:r>
+            <a:r>
+              <a:rPr lang="en-US" dirty="0" smtClean="0"/>
+              <a:t/>
+            </a:r>
+            <a:br>
+              <a:rPr lang="en-US" dirty="0" smtClean="0"/>
+            </a:br>
+            <a:endParaRPr lang="en-ZA" dirty="0"/>
+          </a:p>
+        </p:txBody>
+      </p:sp>
+      <p:sp>
+        <p:nvSpPr>
+          <p:cNvPr id="3" name="Subtitle 2"/>
+          <p:cNvSpPr>
+            <a:spLocks noGrp="1"/>
+          </p:cNvSpPr>
+          <p:nvPr>
+            <p:ph type="subTitle"/>
+          </p:nvPr>
+        </p:nvSpPr>
+        <p:spPr/>
+        <p:txBody>
+          <a:bodyPr/>
+          <a:lstStyle/>
+          <a:p>
+            <a:endParaRPr lang="en-ZA" dirty="0"/>
+          </a:p>
+        </p:txBody>
+      </p:sp>
+      <p:pic>
+        <p:nvPicPr>
+          <p:cNvPr id="5122" name="Picture 2" descr="C:\Users\Waliko\Desktop\getEmail.png"/>
+          <p:cNvPicPr>
+            <a:picLocks noChangeAspect="1" noChangeArrowheads="1"/>
+          </p:cNvPicPr>
           <p:nvPr/>
-        </p:nvSpPr>
-        <p:spPr>
-          <a:xfrm>
-            <a:off x="457200" y="155520"/>
-            <a:ext cx="8229240" cy="1252440"/>
+        </p:nvPicPr>
+        <p:blipFill>
+          <a:blip r:embed="rId2">
+            <a:extLst>
+              <a:ext uri="{28A0092B-C50C-407E-A947-70E740481C1C}">
+                <a14:useLocalDpi xmlns:a14="http://schemas.microsoft.com/office/drawing/2010/main" val="0"/>
+              </a:ext>
+            </a:extLst>
+          </a:blip>
+          <a:srcRect/>
+          <a:stretch>
+            <a:fillRect/>
+          </a:stretch>
+        </p:blipFill>
+        <p:spPr bwMode="auto">
+          <a:xfrm>
+            <a:off x="323528" y="1432687"/>
+            <a:ext cx="3600400" cy="5064392"/>
           </a:xfrm>
           <a:prstGeom prst="rect">
             <a:avLst/>
           </a:prstGeom>
           <a:noFill/>
-          <a:ln>
-            <a:noFill/>
-          </a:ln>
-        </p:spPr>
-        <p:txBody>
-          <a:bodyPr rIns="45720" tIns="45000" bIns="45000" anchor="ctr"/>
-          <a:p>
-            <a:pPr algn="ctr">
-              <a:lnSpc>
-                <a:spcPct val="100000"/>
-              </a:lnSpc>
-            </a:pPr>
-            <a:r>
-              <a:rPr b="1" lang="en-US" sz="4500" strike="noStrike">
-                <a:solidFill>
-                  <a:srgbClr val="f0ad00"/>
-                </a:solidFill>
-                <a:latin typeface="Corbel"/>
-              </a:rPr>
-              <a:t>Code &amp; Results: 2</a:t>
-            </a:r>
-            <a:endParaRPr/>
-          </a:p>
-        </p:txBody>
-      </p:sp>
-      <p:sp>
-        <p:nvSpPr>
-          <p:cNvPr id="91" name="TextShape 2"/>
-          <p:cNvSpPr txBox="1"/>
+          <a:extLst>
+            <a:ext uri="{909E8E84-426E-40DD-AFC4-6F175D3DCCD1}">
+              <a14:hiddenFill xmlns:a14="http://schemas.microsoft.com/office/drawing/2010/main">
+                <a:solidFill>
+                  <a:srgbClr val="FFFFFF"/>
+                </a:solidFill>
+              </a14:hiddenFill>
+            </a:ext>
+          </a:extLst>
+        </p:spPr>
+      </p:pic>
+      <p:pic>
+        <p:nvPicPr>
+          <p:cNvPr id="5123" name="Picture 3" descr="E:\pic\email_output.png"/>
+          <p:cNvPicPr>
+            <a:picLocks noChangeAspect="1" noChangeArrowheads="1"/>
+          </p:cNvPicPr>
           <p:nvPr/>
-        </p:nvSpPr>
-        <p:spPr>
-          <a:xfrm>
-            <a:off x="457200" y="1775160"/>
-            <a:ext cx="8229240" cy="4625280"/>
+        </p:nvPicPr>
+        <p:blipFill>
+          <a:blip r:embed="rId3">
+            <a:extLst>
+              <a:ext uri="{28A0092B-C50C-407E-A947-70E740481C1C}">
+                <a14:useLocalDpi xmlns:a14="http://schemas.microsoft.com/office/drawing/2010/main" val="0"/>
+              </a:ext>
+            </a:extLst>
+          </a:blip>
+          <a:srcRect/>
+          <a:stretch>
+            <a:fillRect/>
+          </a:stretch>
+        </p:blipFill>
+        <p:spPr bwMode="auto">
+          <a:xfrm>
+            <a:off x="4427984" y="3310178"/>
+            <a:ext cx="3973316" cy="993329"/>
           </a:xfrm>
           <a:prstGeom prst="rect">
             <a:avLst/>
           </a:prstGeom>
           <a:noFill/>
-          <a:ln>
-            <a:noFill/>
-          </a:ln>
-        </p:spPr>
-        <p:txBody>
-          <a:bodyPr lIns="54720" rIns="90000" tIns="91440" bIns="45000"/>
-          <a:p>
-            <a:pPr>
-              <a:lnSpc>
-                <a:spcPct val="100000"/>
-              </a:lnSpc>
-              <a:buSzPct val="80000"/>
-              <a:buFont typeface="Wingdings 2" charset="2"/>
-              <a:buChar char=""/>
-            </a:pPr>
-            <a:r>
-              <a:rPr lang="en-US" sz="3200" strike="noStrike">
-                <a:solidFill>
-                  <a:srgbClr val="000000"/>
-                </a:solidFill>
-                <a:latin typeface="Corbel"/>
-              </a:rPr>
-              <a:t>Print screen here</a:t>
-            </a:r>
-            <a:endParaRPr/>
-          </a:p>
-        </p:txBody>
-      </p:sp>
+          <a:extLst>
+            <a:ext uri="{909E8E84-426E-40DD-AFC4-6F175D3DCCD1}">
+              <a14:hiddenFill xmlns:a14="http://schemas.microsoft.com/office/drawing/2010/main">
+                <a:solidFill>
+                  <a:srgbClr val="FFFFFF"/>
+                </a:solidFill>
+              </a14:hiddenFill>
+            </a:ext>
+          </a:extLst>
+        </p:spPr>
+      </p:pic>
     </p:spTree>
+    <p:extLst>
+      <p:ext uri="{BB962C8B-B14F-4D97-AF65-F5344CB8AC3E}">
+        <p14:creationId xmlns:p14="http://schemas.microsoft.com/office/powerpoint/2010/main" val="2285747114"/>
+      </p:ext>
+    </p:extLst>
   </p:cSld>
+  <p:clrMapOvr>
+    <a:masterClrMapping/>
+  </p:clrMapOvr>
   <p:timing>
     <p:tnLst>
       <p:par>
-        <p:cTn id="7" dur="indefinite" restart="never" nodeType="tmRoot">
-          <p:childTnLst>
-            <p:seq>
-              <p:cTn id="8" nodeType="mainSeq"/>
-              <p:prevCondLst>
-                <p:cond delay="0" evt="onPrev">
-                  <p:tgtEl>
-                    <p:sldTgt/>
-                  </p:tgtEl>
-                </p:cond>
-              </p:prevCondLst>
-              <p:nextCondLst>
-                <p:cond delay="0" evt="onNext">
-                  <p:tgtEl>
-                    <p:sldTgt/>
-                  </p:tgtEl>
-                </p:cond>
-              </p:nextCondLst>
-            </p:seq>
-          </p:childTnLst>
-        </p:cTn>
+        <p:cTn id="1" dur="indefinite" restart="never" nodeType="tmRoot"/>
       </p:par>
     </p:tnLst>
   </p:timing>
@@ -4259,7 +4869,7 @@
 </file>
 
 <file path=ppt/slides/slide5.xml><?xml version="1.0" encoding="utf-8"?>
-<p:sld xmlns:a="http://schemas.openxmlformats.org/drawingml/2006/main" xmlns:p="http://schemas.openxmlformats.org/presentationml/2006/main" xmlns:r="http://schemas.openxmlformats.org/officeDocument/2006/relationships">
+<p:sld xmlns:a="http://schemas.openxmlformats.org/drawingml/2006/main" xmlns:r="http://schemas.openxmlformats.org/officeDocument/2006/relationships" xmlns:p="http://schemas.openxmlformats.org/presentationml/2006/main">
   <p:cSld>
     <p:spTree>
       <p:nvGrpSpPr>
@@ -4277,13 +4887,13 @@
       </p:grpSpPr>
       <p:sp>
         <p:nvSpPr>
-          <p:cNvPr id="92" name="TextShape 1"/>
+          <p:cNvPr id="90" name="TextShape 1"/>
           <p:cNvSpPr txBox="1"/>
           <p:nvPr/>
         </p:nvSpPr>
         <p:spPr>
           <a:xfrm>
-            <a:off x="457200" y="155520"/>
+            <a:off x="179512" y="158640"/>
             <a:ext cx="8229240" cy="1252440"/>
           </a:xfrm>
           <a:prstGeom prst="rect">
@@ -4295,29 +4905,39 @@
           </a:ln>
         </p:spPr>
         <p:txBody>
-          <a:bodyPr rIns="45720" tIns="45000" bIns="45000" anchor="ctr"/>
-          <a:p>
-            <a:pPr algn="ctr">
+          <a:bodyPr tIns="45000" rIns="45720" bIns="45000" anchor="ctr"/>
+          <a:lstStyle/>
+          <a:p>
+            <a:pPr algn="r">
               <a:lnSpc>
                 <a:spcPct val="100000"/>
               </a:lnSpc>
             </a:pPr>
             <a:r>
-              <a:rPr b="1" lang="en-US" sz="4500" strike="noStrike">
-                <a:solidFill>
-                  <a:srgbClr val="f0ad00"/>
-                </a:solidFill>
-                <a:latin typeface="Corbel"/>
-              </a:rPr>
-              <a:t>Code &amp; Results: 3 </a:t>
-            </a:r>
-            <a:endParaRPr/>
-          </a:p>
-        </p:txBody>
-      </p:sp>
-      <p:sp>
-        <p:nvSpPr>
-          <p:cNvPr id="93" name="TextShape 2"/>
+              <a:rPr lang="en-US" sz="4500" b="1" strike="noStrike" dirty="0">
+                <a:solidFill>
+                  <a:srgbClr val="F0AD00"/>
+                </a:solidFill>
+                <a:latin typeface="Corbel"/>
+              </a:rPr>
+              <a:t>Code &amp; Results: </a:t>
+            </a:r>
+            <a:r>
+              <a:rPr lang="en-US" sz="4500" b="1" dirty="0" err="1" smtClean="0">
+                <a:solidFill>
+                  <a:srgbClr val="F0AD00"/>
+                </a:solidFill>
+                <a:latin typeface="Corbel"/>
+              </a:rPr>
+              <a:t>ActiveModules</a:t>
+            </a:r>
+            <a:endParaRPr dirty="0"/>
+          </a:p>
+        </p:txBody>
+      </p:sp>
+      <p:sp>
+        <p:nvSpPr>
+          <p:cNvPr id="91" name="TextShape 2"/>
           <p:cNvSpPr txBox="1"/>
           <p:nvPr/>
         </p:nvSpPr>
@@ -4335,7 +4955,8 @@
           </a:ln>
         </p:spPr>
         <p:txBody>
-          <a:bodyPr lIns="54720" rIns="90000" tIns="91440" bIns="45000"/>
+          <a:bodyPr lIns="54720" tIns="91440" rIns="90000" bIns="45000"/>
+          <a:lstStyle/>
           <a:p>
             <a:pPr>
               <a:lnSpc>
@@ -4358,24 +4979,109 @@
           </a:p>
         </p:txBody>
       </p:sp>
+      <p:pic>
+        <p:nvPicPr>
+          <p:cNvPr id="2050" name="Picture 2" descr="C:\Users\Waliko\Desktop\activeModules.png"/>
+          <p:cNvPicPr>
+            <a:picLocks noChangeAspect="1" noChangeArrowheads="1"/>
+          </p:cNvPicPr>
+          <p:nvPr/>
+        </p:nvPicPr>
+        <p:blipFill>
+          <a:blip r:embed="rId2">
+            <a:extLst>
+              <a:ext uri="{28A0092B-C50C-407E-A947-70E740481C1C}">
+                <a14:useLocalDpi xmlns:a14="http://schemas.microsoft.com/office/drawing/2010/main" val="0"/>
+              </a:ext>
+            </a:extLst>
+          </a:blip>
+          <a:srcRect/>
+          <a:stretch>
+            <a:fillRect/>
+          </a:stretch>
+        </p:blipFill>
+        <p:spPr bwMode="auto">
+          <a:xfrm>
+            <a:off x="457200" y="1775160"/>
+            <a:ext cx="3491186" cy="4648657"/>
+          </a:xfrm>
+          <a:prstGeom prst="rect">
+            <a:avLst/>
+          </a:prstGeom>
+          <a:noFill/>
+          <a:extLst>
+            <a:ext uri="{909E8E84-426E-40DD-AFC4-6F175D3DCCD1}">
+              <a14:hiddenFill xmlns:a14="http://schemas.microsoft.com/office/drawing/2010/main">
+                <a:solidFill>
+                  <a:srgbClr val="FFFFFF"/>
+                </a:solidFill>
+              </a14:hiddenFill>
+            </a:ext>
+          </a:extLst>
+        </p:spPr>
+      </p:pic>
+      <p:pic>
+        <p:nvPicPr>
+          <p:cNvPr id="2051" name="Picture 3" descr="E:\pic\activeModules_output.png"/>
+          <p:cNvPicPr>
+            <a:picLocks noChangeAspect="1" noChangeArrowheads="1"/>
+          </p:cNvPicPr>
+          <p:nvPr/>
+        </p:nvPicPr>
+        <p:blipFill>
+          <a:blip r:embed="rId3">
+            <a:extLst>
+              <a:ext uri="{28A0092B-C50C-407E-A947-70E740481C1C}">
+                <a14:useLocalDpi xmlns:a14="http://schemas.microsoft.com/office/drawing/2010/main" val="0"/>
+              </a:ext>
+            </a:extLst>
+          </a:blip>
+          <a:srcRect/>
+          <a:stretch>
+            <a:fillRect/>
+          </a:stretch>
+        </p:blipFill>
+        <p:spPr bwMode="auto">
+          <a:xfrm>
+            <a:off x="5940152" y="2171221"/>
+            <a:ext cx="2207899" cy="3833158"/>
+          </a:xfrm>
+          <a:prstGeom prst="rect">
+            <a:avLst/>
+          </a:prstGeom>
+          <a:noFill/>
+          <a:extLst>
+            <a:ext uri="{909E8E84-426E-40DD-AFC4-6F175D3DCCD1}">
+              <a14:hiddenFill xmlns:a14="http://schemas.microsoft.com/office/drawing/2010/main">
+                <a:solidFill>
+                  <a:srgbClr val="FFFFFF"/>
+                </a:solidFill>
+              </a14:hiddenFill>
+            </a:ext>
+          </a:extLst>
+        </p:spPr>
+      </p:pic>
     </p:spTree>
   </p:cSld>
+  <p:clrMapOvr>
+    <a:masterClrMapping/>
+  </p:clrMapOvr>
   <p:timing>
     <p:tnLst>
       <p:par>
-        <p:cTn id="9" dur="indefinite" restart="never" nodeType="tmRoot">
+        <p:cTn id="1" dur="indefinite" restart="never" nodeType="tmRoot">
           <p:childTnLst>
             <p:seq>
-              <p:cTn id="10" nodeType="mainSeq"/>
+              <p:cTn id="2" nodeType="mainSeq"/>
               <p:prevCondLst>
-                <p:cond delay="0" evt="onPrev">
+                <p:cond evt="onPrev" delay="0">
                   <p:tgtEl>
                     <p:sldTgt/>
                   </p:tgtEl>
                 </p:cond>
               </p:prevCondLst>
               <p:nextCondLst>
-                <p:cond delay="0" evt="onNext">
+                <p:cond evt="onNext" delay="0">
                   <p:tgtEl>
                     <p:sldTgt/>
                   </p:tgtEl>
@@ -4391,7 +5097,7 @@
 </file>
 
 <file path=ppt/slides/slide6.xml><?xml version="1.0" encoding="utf-8"?>
-<p:sld xmlns:a="http://schemas.openxmlformats.org/drawingml/2006/main" xmlns:p="http://schemas.openxmlformats.org/presentationml/2006/main" xmlns:r="http://schemas.openxmlformats.org/officeDocument/2006/relationships">
+<p:sld xmlns:a="http://schemas.openxmlformats.org/drawingml/2006/main" xmlns:r="http://schemas.openxmlformats.org/officeDocument/2006/relationships" xmlns:p="http://schemas.openxmlformats.org/presentationml/2006/main">
   <p:cSld>
     <p:spTree>
       <p:nvGrpSpPr>
@@ -4409,13 +5115,13 @@
       </p:grpSpPr>
       <p:sp>
         <p:nvSpPr>
-          <p:cNvPr id="94" name="TextShape 1"/>
+          <p:cNvPr id="92" name="TextShape 1"/>
           <p:cNvSpPr txBox="1"/>
           <p:nvPr/>
         </p:nvSpPr>
         <p:spPr>
           <a:xfrm>
-            <a:off x="457200" y="155520"/>
+            <a:off x="457200" y="141310"/>
             <a:ext cx="8229240" cy="1252440"/>
           </a:xfrm>
           <a:prstGeom prst="rect">
@@ -4427,7 +5133,8 @@
           </a:ln>
         </p:spPr>
         <p:txBody>
-          <a:bodyPr rIns="45720" tIns="45000" bIns="45000" anchor="ctr"/>
+          <a:bodyPr tIns="45000" rIns="45720" bIns="45000" anchor="ctr"/>
+          <a:lstStyle/>
           <a:p>
             <a:pPr algn="ctr">
               <a:lnSpc>
@@ -4435,30 +5142,30 @@
               </a:lnSpc>
             </a:pPr>
             <a:r>
-              <a:rPr b="1" lang="en-US" sz="4500" strike="noStrike">
-                <a:solidFill>
-                  <a:srgbClr val="f0ad00"/>
-                </a:solidFill>
-                <a:latin typeface="Corbel"/>
-              </a:rPr>
-              <a:t> </a:t>
-            </a:r>
-            <a:r>
-              <a:rPr b="1" lang="en-US" sz="4500" strike="noStrike">
-                <a:solidFill>
-                  <a:srgbClr val="f0ad00"/>
-                </a:solidFill>
-                <a:latin typeface="Corbel"/>
-              </a:rPr>
-              <a:t>Unit Test</a:t>
-            </a:r>
-            <a:endParaRPr/>
-          </a:p>
-        </p:txBody>
-      </p:sp>
-      <p:sp>
-        <p:nvSpPr>
-          <p:cNvPr id="95" name="TextShape 2"/>
+              <a:rPr lang="en-US" sz="4500" b="1" strike="noStrike" dirty="0">
+                <a:solidFill>
+                  <a:srgbClr val="F0AD00"/>
+                </a:solidFill>
+                <a:latin typeface="Corbel"/>
+              </a:rPr>
+              <a:t>Code &amp; Results: </a:t>
+            </a:r>
+            <a:r>
+              <a:rPr lang="en-US" sz="4500" b="1" dirty="0" err="1" smtClean="0">
+                <a:solidFill>
+                  <a:srgbClr val="F0AD00"/>
+                </a:solidFill>
+                <a:latin typeface="Corbel"/>
+              </a:rPr>
+              <a:t>UserRoleForModule</a:t>
+            </a:r>
+            <a:endParaRPr dirty="0"/>
+          </a:p>
+        </p:txBody>
+      </p:sp>
+      <p:sp>
+        <p:nvSpPr>
+          <p:cNvPr id="93" name="TextShape 2"/>
           <p:cNvSpPr txBox="1"/>
           <p:nvPr/>
         </p:nvSpPr>
@@ -4476,7 +5183,8 @@
           </a:ln>
         </p:spPr>
         <p:txBody>
-          <a:bodyPr lIns="54720" rIns="90000" tIns="91440" bIns="45000"/>
+          <a:bodyPr lIns="54720" tIns="91440" rIns="90000" bIns="45000"/>
+          <a:lstStyle/>
           <a:p>
             <a:pPr>
               <a:lnSpc>
@@ -4493,30 +5201,115 @@
                 </a:solidFill>
                 <a:latin typeface="Corbel"/>
               </a:rPr>
-              <a:t>Screens shot here </a:t>
-            </a:r>
-            <a:endParaRPr/>
-          </a:p>
-        </p:txBody>
-      </p:sp>
+              <a:t>Print screen here</a:t>
+            </a:r>
+            <a:endParaRPr/>
+          </a:p>
+        </p:txBody>
+      </p:sp>
+      <p:pic>
+        <p:nvPicPr>
+          <p:cNvPr id="3075" name="Picture 3" descr="C:\Users\Waliko\Desktop\userRolesforModule.png"/>
+          <p:cNvPicPr>
+            <a:picLocks noChangeAspect="1" noChangeArrowheads="1"/>
+          </p:cNvPicPr>
+          <p:nvPr/>
+        </p:nvPicPr>
+        <p:blipFill>
+          <a:blip r:embed="rId2">
+            <a:extLst>
+              <a:ext uri="{28A0092B-C50C-407E-A947-70E740481C1C}">
+                <a14:useLocalDpi xmlns:a14="http://schemas.microsoft.com/office/drawing/2010/main" val="0"/>
+              </a:ext>
+            </a:extLst>
+          </a:blip>
+          <a:srcRect/>
+          <a:stretch>
+            <a:fillRect/>
+          </a:stretch>
+        </p:blipFill>
+        <p:spPr bwMode="auto">
+          <a:xfrm>
+            <a:off x="303733" y="1775160"/>
+            <a:ext cx="4457269" cy="4822192"/>
+          </a:xfrm>
+          <a:prstGeom prst="rect">
+            <a:avLst/>
+          </a:prstGeom>
+          <a:noFill/>
+          <a:extLst>
+            <a:ext uri="{909E8E84-426E-40DD-AFC4-6F175D3DCCD1}">
+              <a14:hiddenFill xmlns:a14="http://schemas.microsoft.com/office/drawing/2010/main">
+                <a:solidFill>
+                  <a:srgbClr val="FFFFFF"/>
+                </a:solidFill>
+              </a14:hiddenFill>
+            </a:ext>
+          </a:extLst>
+        </p:spPr>
+      </p:pic>
+      <p:pic>
+        <p:nvPicPr>
+          <p:cNvPr id="3076" name="Picture 4" descr="E:\pic\userRolesForModules.png"/>
+          <p:cNvPicPr>
+            <a:picLocks noChangeAspect="1" noChangeArrowheads="1"/>
+          </p:cNvPicPr>
+          <p:nvPr/>
+        </p:nvPicPr>
+        <p:blipFill>
+          <a:blip r:embed="rId3">
+            <a:extLst>
+              <a:ext uri="{28A0092B-C50C-407E-A947-70E740481C1C}">
+                <a14:useLocalDpi xmlns:a14="http://schemas.microsoft.com/office/drawing/2010/main" val="0"/>
+              </a:ext>
+            </a:extLst>
+          </a:blip>
+          <a:srcRect/>
+          <a:stretch>
+            <a:fillRect/>
+          </a:stretch>
+        </p:blipFill>
+        <p:spPr bwMode="auto">
+          <a:xfrm>
+            <a:off x="5203866" y="2641979"/>
+            <a:ext cx="3470157" cy="1728531"/>
+          </a:xfrm>
+          <a:prstGeom prst="rect">
+            <a:avLst/>
+          </a:prstGeom>
+          <a:noFill/>
+          <a:extLst>
+            <a:ext uri="{909E8E84-426E-40DD-AFC4-6F175D3DCCD1}">
+              <a14:hiddenFill xmlns:a14="http://schemas.microsoft.com/office/drawing/2010/main">
+                <a:solidFill>
+                  <a:srgbClr val="FFFFFF"/>
+                </a:solidFill>
+              </a14:hiddenFill>
+            </a:ext>
+          </a:extLst>
+        </p:spPr>
+      </p:pic>
     </p:spTree>
   </p:cSld>
+  <p:clrMapOvr>
+    <a:masterClrMapping/>
+  </p:clrMapOvr>
   <p:timing>
     <p:tnLst>
       <p:par>
-        <p:cTn id="11" dur="indefinite" restart="never" nodeType="tmRoot">
+        <p:cTn id="1" dur="indefinite" restart="never" nodeType="tmRoot">
           <p:childTnLst>
             <p:seq>
-              <p:cTn id="12" nodeType="mainSeq"/>
+              <p:cTn id="2" nodeType="mainSeq"/>
               <p:prevCondLst>
-                <p:cond delay="0" evt="onPrev">
+                <p:cond evt="onPrev" delay="0">
                   <p:tgtEl>
                     <p:sldTgt/>
                   </p:tgtEl>
                 </p:cond>
               </p:prevCondLst>
               <p:nextCondLst>
-                <p:cond delay="0" evt="onNext">
+                <p:cond evt="onNext" delay="0">
                   <p:tgtEl>
                     <p:sldTgt/>
                   </p:tgtEl>
@@ -4532,7 +5325,7 @@
 </file>
 
 <file path=ppt/slides/slide7.xml><?xml version="1.0" encoding="utf-8"?>
-<p:sld xmlns:a="http://schemas.openxmlformats.org/drawingml/2006/main" xmlns:p="http://schemas.openxmlformats.org/presentationml/2006/main" xmlns:r="http://schemas.openxmlformats.org/officeDocument/2006/relationships">
+<p:sld xmlns:a="http://schemas.openxmlformats.org/drawingml/2006/main" xmlns:r="http://schemas.openxmlformats.org/officeDocument/2006/relationships" xmlns:p="http://schemas.openxmlformats.org/presentationml/2006/main">
   <p:cSld>
     <p:spTree>
       <p:nvGrpSpPr>
@@ -4550,122 +5343,182 @@
       </p:grpSpPr>
       <p:sp>
         <p:nvSpPr>
-          <p:cNvPr id="96" name="TextShape 1"/>
-          <p:cNvSpPr txBox="1"/>
+          <p:cNvPr id="2" name="Title 1"/>
+          <p:cNvSpPr>
+            <a:spLocks noGrp="1"/>
+          </p:cNvSpPr>
+          <p:nvPr>
+            <p:ph type="title"/>
+          </p:nvPr>
+        </p:nvSpPr>
+        <p:spPr>
+          <a:xfrm>
+            <a:off x="179512" y="232344"/>
+            <a:ext cx="8686440" cy="1252440"/>
+          </a:xfrm>
+        </p:spPr>
+        <p:txBody>
+          <a:bodyPr/>
+          <a:lstStyle/>
+          <a:p>
+            <a:r>
+              <a:rPr lang="en-US" sz="4000" b="1" strike="noStrike" dirty="0" smtClean="0">
+                <a:solidFill>
+                  <a:srgbClr val="F0AD00"/>
+                </a:solidFill>
+                <a:latin typeface="Corbel"/>
+              </a:rPr>
+              <a:t>Code &amp; </a:t>
+            </a:r>
+            <a:r>
+              <a:rPr lang="en-US" sz="4000" b="1" strike="noStrike" dirty="0" err="1" smtClean="0">
+                <a:solidFill>
+                  <a:srgbClr val="F0AD00"/>
+                </a:solidFill>
+                <a:latin typeface="Corbel"/>
+              </a:rPr>
+              <a:t>Results:UserRole</a:t>
+            </a:r>
+            <a:r>
+              <a:rPr lang="en-US" sz="4000" b="1" dirty="0" err="1" smtClean="0">
+                <a:solidFill>
+                  <a:srgbClr val="F0AD00"/>
+                </a:solidFill>
+                <a:latin typeface="Corbel"/>
+              </a:rPr>
+              <a:t>ForSpecific</a:t>
+            </a:r>
+            <a:r>
+              <a:rPr lang="en-US" dirty="0" smtClean="0"/>
+              <a:t/>
+            </a:r>
+            <a:br>
+              <a:rPr lang="en-US" dirty="0" smtClean="0"/>
+            </a:br>
+            <a:endParaRPr lang="en-ZA" dirty="0"/>
+          </a:p>
+        </p:txBody>
+      </p:sp>
+      <p:sp>
+        <p:nvSpPr>
+          <p:cNvPr id="3" name="Subtitle 2"/>
+          <p:cNvSpPr>
+            <a:spLocks noGrp="1"/>
+          </p:cNvSpPr>
+          <p:nvPr>
+            <p:ph type="subTitle"/>
+          </p:nvPr>
+        </p:nvSpPr>
+        <p:spPr>
+          <a:xfrm>
+            <a:off x="457200" y="1775160"/>
+            <a:ext cx="8373690" cy="4822192"/>
+          </a:xfrm>
+        </p:spPr>
+        <p:txBody>
+          <a:bodyPr/>
+          <a:lstStyle/>
+          <a:p>
+            <a:endParaRPr lang="en-ZA" dirty="0"/>
+          </a:p>
+        </p:txBody>
+      </p:sp>
+      <p:pic>
+        <p:nvPicPr>
+          <p:cNvPr id="6146" name="Picture 2" descr="C:\Users\Waliko\Desktop\UserWithRoles.png"/>
+          <p:cNvPicPr>
+            <a:picLocks noChangeAspect="1" noChangeArrowheads="1"/>
+          </p:cNvPicPr>
           <p:nvPr/>
-        </p:nvSpPr>
-        <p:spPr>
-          <a:xfrm>
-            <a:off x="457200" y="155520"/>
-            <a:ext cx="8229240" cy="1252440"/>
+        </p:nvPicPr>
+        <p:blipFill>
+          <a:blip r:embed="rId2">
+            <a:extLst>
+              <a:ext uri="{28A0092B-C50C-407E-A947-70E740481C1C}">
+                <a14:useLocalDpi xmlns:a14="http://schemas.microsoft.com/office/drawing/2010/main" val="0"/>
+              </a:ext>
+            </a:extLst>
+          </a:blip>
+          <a:srcRect/>
+          <a:stretch>
+            <a:fillRect/>
+          </a:stretch>
+        </p:blipFill>
+        <p:spPr bwMode="auto">
+          <a:xfrm>
+            <a:off x="0" y="1484784"/>
+            <a:ext cx="4339039" cy="5112568"/>
           </a:xfrm>
           <a:prstGeom prst="rect">
             <a:avLst/>
           </a:prstGeom>
           <a:noFill/>
-          <a:ln>
-            <a:noFill/>
-          </a:ln>
-        </p:spPr>
-        <p:txBody>
-          <a:bodyPr rIns="45720" tIns="45000" bIns="45000" anchor="ctr"/>
-          <a:p>
-            <a:pPr algn="ctr">
-              <a:lnSpc>
-                <a:spcPct val="100000"/>
-              </a:lnSpc>
-            </a:pPr>
-            <a:r>
-              <a:rPr b="1" lang="en-US" sz="4500" strike="noStrike">
-                <a:solidFill>
-                  <a:srgbClr val="f0ad00"/>
-                </a:solidFill>
-                <a:latin typeface="Corbel"/>
-              </a:rPr>
-              <a:t> </a:t>
-            </a:r>
-            <a:r>
-              <a:rPr b="1" lang="en-US" sz="4500" strike="noStrike">
-                <a:solidFill>
-                  <a:srgbClr val="f0ad00"/>
-                </a:solidFill>
-                <a:latin typeface="Corbel"/>
-              </a:rPr>
-              <a:t>Unit Test</a:t>
-            </a:r>
-            <a:endParaRPr/>
-          </a:p>
-        </p:txBody>
-      </p:sp>
-      <p:sp>
-        <p:nvSpPr>
-          <p:cNvPr id="97" name="TextShape 2"/>
-          <p:cNvSpPr txBox="1"/>
+          <a:extLst>
+            <a:ext uri="{909E8E84-426E-40DD-AFC4-6F175D3DCCD1}">
+              <a14:hiddenFill xmlns:a14="http://schemas.microsoft.com/office/drawing/2010/main">
+                <a:solidFill>
+                  <a:srgbClr val="FFFFFF"/>
+                </a:solidFill>
+              </a14:hiddenFill>
+            </a:ext>
+          </a:extLst>
+        </p:spPr>
+      </p:pic>
+      <p:pic>
+        <p:nvPicPr>
+          <p:cNvPr id="6147" name="Picture 3" descr="E:\pic\userForSpecificMod_output.png"/>
+          <p:cNvPicPr>
+            <a:picLocks noChangeAspect="1" noChangeArrowheads="1"/>
+          </p:cNvPicPr>
           <p:nvPr/>
-        </p:nvSpPr>
-        <p:spPr>
-          <a:xfrm>
-            <a:off x="457200" y="1775160"/>
-            <a:ext cx="8229240" cy="4625280"/>
+        </p:nvPicPr>
+        <p:blipFill>
+          <a:blip r:embed="rId3">
+            <a:extLst>
+              <a:ext uri="{28A0092B-C50C-407E-A947-70E740481C1C}">
+                <a14:useLocalDpi xmlns:a14="http://schemas.microsoft.com/office/drawing/2010/main" val="0"/>
+              </a:ext>
+            </a:extLst>
+          </a:blip>
+          <a:srcRect/>
+          <a:stretch>
+            <a:fillRect/>
+          </a:stretch>
+        </p:blipFill>
+        <p:spPr bwMode="auto">
+          <a:xfrm>
+            <a:off x="3923928" y="3861048"/>
+            <a:ext cx="4906962" cy="1484716"/>
           </a:xfrm>
           <a:prstGeom prst="rect">
             <a:avLst/>
           </a:prstGeom>
           <a:noFill/>
-          <a:ln>
-            <a:noFill/>
-          </a:ln>
-        </p:spPr>
-        <p:txBody>
-          <a:bodyPr lIns="54720" rIns="90000" tIns="91440" bIns="45000"/>
-          <a:p>
-            <a:pPr>
-              <a:lnSpc>
-                <a:spcPct val="100000"/>
-              </a:lnSpc>
-              <a:buSzPct val="80000"/>
-              <a:buFont typeface="Wingdings 2" charset="2"/>
-              <a:buChar char=""/>
-            </a:pPr>
-            <a:r>
-              <a:rPr lang="en-US" sz="3200" strike="noStrike">
-                <a:solidFill>
-                  <a:srgbClr val="000000"/>
-                </a:solidFill>
-                <a:latin typeface="Corbel"/>
-              </a:rPr>
-              <a:t>Screen shot </a:t>
-            </a:r>
-            <a:endParaRPr/>
-          </a:p>
-        </p:txBody>
-      </p:sp>
+          <a:extLst>
+            <a:ext uri="{909E8E84-426E-40DD-AFC4-6F175D3DCCD1}">
+              <a14:hiddenFill xmlns:a14="http://schemas.microsoft.com/office/drawing/2010/main">
+                <a:solidFill>
+                  <a:srgbClr val="FFFFFF"/>
+                </a:solidFill>
+              </a14:hiddenFill>
+            </a:ext>
+          </a:extLst>
+        </p:spPr>
+      </p:pic>
     </p:spTree>
+    <p:extLst>
+      <p:ext uri="{BB962C8B-B14F-4D97-AF65-F5344CB8AC3E}">
+        <p14:creationId xmlns:p14="http://schemas.microsoft.com/office/powerpoint/2010/main" val="3841959058"/>
+      </p:ext>
+    </p:extLst>
   </p:cSld>
+  <p:clrMapOvr>
+    <a:masterClrMapping/>
+  </p:clrMapOvr>
   <p:timing>
     <p:tnLst>
       <p:par>
-        <p:cTn id="13" dur="indefinite" restart="never" nodeType="tmRoot">
-          <p:childTnLst>
-            <p:seq>
-              <p:cTn id="14" nodeType="mainSeq"/>
-              <p:prevCondLst>
-                <p:cond delay="0" evt="onPrev">
-                  <p:tgtEl>
-                    <p:sldTgt/>
-                  </p:tgtEl>
-                </p:cond>
-              </p:prevCondLst>
-              <p:nextCondLst>
-                <p:cond delay="0" evt="onNext">
-                  <p:tgtEl>
-                    <p:sldTgt/>
-                  </p:tgtEl>
-                </p:cond>
-              </p:nextCondLst>
-            </p:seq>
-          </p:childTnLst>
-        </p:cTn>
+        <p:cTn id="1" dur="indefinite" restart="never" nodeType="tmRoot"/>
       </p:par>
     </p:tnLst>
   </p:timing>
@@ -4673,7 +5526,7 @@
 </file>
 
 <file path=ppt/slides/slide8.xml><?xml version="1.0" encoding="utf-8"?>
-<p:sld xmlns:a="http://schemas.openxmlformats.org/drawingml/2006/main" xmlns:p="http://schemas.openxmlformats.org/presentationml/2006/main" xmlns:r="http://schemas.openxmlformats.org/officeDocument/2006/relationships">
+<p:sld xmlns:a="http://schemas.openxmlformats.org/drawingml/2006/main" xmlns:r="http://schemas.openxmlformats.org/officeDocument/2006/relationships" xmlns:p="http://schemas.openxmlformats.org/presentationml/2006/main">
   <p:cSld>
     <p:spTree>
       <p:nvGrpSpPr>
@@ -4691,7 +5544,7 @@
       </p:grpSpPr>
       <p:sp>
         <p:nvSpPr>
-          <p:cNvPr id="98" name="TextShape 1"/>
+          <p:cNvPr id="94" name="TextShape 1"/>
           <p:cNvSpPr txBox="1"/>
           <p:nvPr/>
         </p:nvSpPr>
@@ -4709,7 +5562,8 @@
           </a:ln>
         </p:spPr>
         <p:txBody>
-          <a:bodyPr rIns="45720" tIns="45000" bIns="45000" anchor="ctr"/>
+          <a:bodyPr tIns="45000" rIns="45720" bIns="45000" anchor="ctr"/>
+          <a:lstStyle/>
           <a:p>
             <a:pPr algn="ctr">
               <a:lnSpc>
@@ -4717,27 +5571,27 @@
               </a:lnSpc>
             </a:pPr>
             <a:r>
-              <a:rPr b="1" lang="en-US" sz="4500" strike="noStrike">
-                <a:solidFill>
-                  <a:srgbClr val="f0ad00"/>
-                </a:solidFill>
-                <a:latin typeface="Corbel"/>
-              </a:rPr>
-              <a:t>Challenges faced with Code</a:t>
-            </a:r>
-            <a:endParaRPr/>
-          </a:p>
-        </p:txBody>
-      </p:sp>
-      <p:sp>
-        <p:nvSpPr>
-          <p:cNvPr id="99" name="TextShape 2"/>
+              <a:rPr lang="en-US" sz="4500" b="1" strike="noStrike">
+                <a:solidFill>
+                  <a:srgbClr val="F0AD00"/>
+                </a:solidFill>
+                <a:latin typeface="Corbel"/>
+              </a:rPr>
+              <a:t> Unit Test</a:t>
+            </a:r>
+            <a:endParaRPr/>
+          </a:p>
+        </p:txBody>
+      </p:sp>
+      <p:sp>
+        <p:nvSpPr>
+          <p:cNvPr id="95" name="TextShape 2"/>
           <p:cNvSpPr txBox="1"/>
           <p:nvPr/>
         </p:nvSpPr>
         <p:spPr>
           <a:xfrm>
-            <a:off x="539640" y="1772640"/>
+            <a:off x="457200" y="1775160"/>
             <a:ext cx="8229240" cy="4625280"/>
           </a:xfrm>
           <a:prstGeom prst="rect">
@@ -4749,7 +5603,8 @@
           </a:ln>
         </p:spPr>
         <p:txBody>
-          <a:bodyPr lIns="54720" rIns="90000" tIns="91440" bIns="45000"/>
+          <a:bodyPr lIns="54720" tIns="91440" rIns="90000" bIns="45000"/>
+          <a:lstStyle/>
           <a:p>
             <a:pPr>
               <a:lnSpc>
@@ -4766,30 +5621,74 @@
                 </a:solidFill>
                 <a:latin typeface="Corbel"/>
               </a:rPr>
-              <a:t>Due to the asynchronous nature of node.js and the ldapjs API we have had great difficulty in returning the data required even though we were able to access the data from ldap successfully.</a:t>
-            </a:r>
-            <a:endParaRPr/>
-          </a:p>
-        </p:txBody>
-      </p:sp>
+              <a:t>Screens shot here </a:t>
+            </a:r>
+            <a:endParaRPr/>
+          </a:p>
+        </p:txBody>
+      </p:sp>
+      <p:pic>
+        <p:nvPicPr>
+          <p:cNvPr id="4098" name="Picture 2" descr="C:\Users\Waliko\Desktop\unit_testing_output.png"/>
+          <p:cNvPicPr>
+            <a:picLocks noChangeAspect="1" noChangeArrowheads="1"/>
+          </p:cNvPicPr>
+          <p:nvPr/>
+        </p:nvPicPr>
+        <p:blipFill>
+          <a:blip r:embed="rId2">
+            <a:extLst>
+              <a:ext uri="{28A0092B-C50C-407E-A947-70E740481C1C}">
+                <a14:useLocalDpi xmlns:a14="http://schemas.microsoft.com/office/drawing/2010/main" val="0"/>
+              </a:ext>
+            </a:extLst>
+          </a:blip>
+          <a:srcRect/>
+          <a:stretch>
+            <a:fillRect/>
+          </a:stretch>
+        </p:blipFill>
+        <p:spPr bwMode="auto">
+          <a:xfrm>
+            <a:off x="457200" y="1931904"/>
+            <a:ext cx="8357537" cy="3744416"/>
+          </a:xfrm>
+          <a:prstGeom prst="rect">
+            <a:avLst/>
+          </a:prstGeom>
+          <a:noFill/>
+          <a:extLst>
+            <a:ext uri="{909E8E84-426E-40DD-AFC4-6F175D3DCCD1}">
+              <a14:hiddenFill xmlns:a14="http://schemas.microsoft.com/office/drawing/2010/main">
+                <a:solidFill>
+                  <a:srgbClr val="FFFFFF"/>
+                </a:solidFill>
+              </a14:hiddenFill>
+            </a:ext>
+          </a:extLst>
+        </p:spPr>
+      </p:pic>
     </p:spTree>
   </p:cSld>
+  <p:clrMapOvr>
+    <a:masterClrMapping/>
+  </p:clrMapOvr>
   <p:timing>
     <p:tnLst>
       <p:par>
-        <p:cTn id="15" dur="indefinite" restart="never" nodeType="tmRoot">
+        <p:cTn id="1" dur="indefinite" restart="never" nodeType="tmRoot">
           <p:childTnLst>
             <p:seq>
-              <p:cTn id="16" nodeType="mainSeq"/>
+              <p:cTn id="2" nodeType="mainSeq"/>
               <p:prevCondLst>
-                <p:cond delay="0" evt="onPrev">
+                <p:cond evt="onPrev" delay="0">
                   <p:tgtEl>
                     <p:sldTgt/>
                   </p:tgtEl>
                 </p:cond>
               </p:prevCondLst>
               <p:nextCondLst>
-                <p:cond delay="0" evt="onNext">
+                <p:cond evt="onNext" delay="0">
                   <p:tgtEl>
                     <p:sldTgt/>
                   </p:tgtEl>
@@ -4805,7 +5704,7 @@
 </file>
 
 <file path=ppt/slides/slide9.xml><?xml version="1.0" encoding="utf-8"?>
-<p:sld xmlns:a="http://schemas.openxmlformats.org/drawingml/2006/main" xmlns:p="http://schemas.openxmlformats.org/presentationml/2006/main" xmlns:r="http://schemas.openxmlformats.org/officeDocument/2006/relationships">
+<p:sld xmlns:a="http://schemas.openxmlformats.org/drawingml/2006/main" xmlns:r="http://schemas.openxmlformats.org/officeDocument/2006/relationships" xmlns:p="http://schemas.openxmlformats.org/presentationml/2006/main">
   <p:cSld>
     <p:spTree>
       <p:nvGrpSpPr>
@@ -4823,7 +5722,7 @@
       </p:grpSpPr>
       <p:sp>
         <p:nvSpPr>
-          <p:cNvPr id="100" name="TextShape 1"/>
+          <p:cNvPr id="98" name="TextShape 1"/>
           <p:cNvSpPr txBox="1"/>
           <p:nvPr/>
         </p:nvSpPr>
@@ -4841,7 +5740,8 @@
           </a:ln>
         </p:spPr>
         <p:txBody>
-          <a:bodyPr rIns="45720" tIns="45000" bIns="45000" anchor="ctr"/>
+          <a:bodyPr tIns="45000" rIns="45720" bIns="45000" anchor="ctr"/>
+          <a:lstStyle/>
           <a:p>
             <a:pPr algn="ctr">
               <a:lnSpc>
@@ -4849,27 +5749,27 @@
               </a:lnSpc>
             </a:pPr>
             <a:r>
-              <a:rPr b="1" lang="en-US" sz="4500" strike="noStrike">
-                <a:solidFill>
-                  <a:srgbClr val="f0ad00"/>
-                </a:solidFill>
-                <a:latin typeface="Corbel"/>
-              </a:rPr>
-              <a:t>Challenges faced with Mid-level</a:t>
-            </a:r>
-            <a:endParaRPr/>
-          </a:p>
-        </p:txBody>
-      </p:sp>
-      <p:sp>
-        <p:nvSpPr>
-          <p:cNvPr id="101" name="TextShape 2"/>
+              <a:rPr lang="en-US" sz="4500" b="1" strike="noStrike">
+                <a:solidFill>
+                  <a:srgbClr val="F0AD00"/>
+                </a:solidFill>
+                <a:latin typeface="Corbel"/>
+              </a:rPr>
+              <a:t>Challenges faced with Code</a:t>
+            </a:r>
+            <a:endParaRPr/>
+          </a:p>
+        </p:txBody>
+      </p:sp>
+      <p:sp>
+        <p:nvSpPr>
+          <p:cNvPr id="99" name="TextShape 2"/>
           <p:cNvSpPr txBox="1"/>
           <p:nvPr/>
         </p:nvSpPr>
         <p:spPr>
           <a:xfrm>
-            <a:off x="457200" y="1775160"/>
+            <a:off x="539640" y="1772640"/>
             <a:ext cx="8229240" cy="4625280"/>
           </a:xfrm>
           <a:prstGeom prst="rect">
@@ -4881,7 +5781,8 @@
           </a:ln>
         </p:spPr>
         <p:txBody>
-          <a:bodyPr lIns="54720" rIns="90000" tIns="91440" bIns="45000"/>
+          <a:bodyPr lIns="54720" tIns="91440" rIns="90000" bIns="45000"/>
+          <a:lstStyle/>
           <a:p>
             <a:pPr>
               <a:lnSpc>
@@ -4892,23 +5793,59 @@
               <a:buChar char=""/>
             </a:pPr>
             <a:r>
-              <a:rPr lang="en-US" sz="3200" strike="noStrike">
+              <a:rPr lang="en-US" sz="3200" strike="noStrike" dirty="0">
                 <a:solidFill>
                   <a:srgbClr val="000000"/>
                 </a:solidFill>
                 <a:latin typeface="Corbel"/>
               </a:rPr>
-              <a:t>Time pleasure</a:t>
-            </a:r>
-            <a:endParaRPr/>
-          </a:p>
-          <a:p>
-            <a:pPr>
-              <a:lnSpc>
-                <a:spcPct val="100000"/>
-              </a:lnSpc>
-            </a:pPr>
-            <a:endParaRPr/>
+              <a:t>Due to the asynchronous nature of node.js and the </a:t>
+            </a:r>
+            <a:r>
+              <a:rPr lang="en-US" sz="3200" strike="noStrike" dirty="0" err="1">
+                <a:solidFill>
+                  <a:srgbClr val="000000"/>
+                </a:solidFill>
+                <a:latin typeface="Corbel"/>
+              </a:rPr>
+              <a:t>ldapjs</a:t>
+            </a:r>
+            <a:r>
+              <a:rPr lang="en-US" sz="3200" strike="noStrike" dirty="0">
+                <a:solidFill>
+                  <a:srgbClr val="000000"/>
+                </a:solidFill>
+                <a:latin typeface="Corbel"/>
+              </a:rPr>
+              <a:t> API we have had great difficulty in returning the data required even though we were able to access the data from </a:t>
+            </a:r>
+            <a:r>
+              <a:rPr lang="en-US" sz="3200" strike="noStrike" dirty="0" err="1">
+                <a:solidFill>
+                  <a:srgbClr val="000000"/>
+                </a:solidFill>
+                <a:latin typeface="Corbel"/>
+              </a:rPr>
+              <a:t>ldap</a:t>
+            </a:r>
+            <a:r>
+              <a:rPr lang="en-US" sz="3200" strike="noStrike" dirty="0">
+                <a:solidFill>
+                  <a:srgbClr val="000000"/>
+                </a:solidFill>
+                <a:latin typeface="Corbel"/>
+              </a:rPr>
+              <a:t> successfully</a:t>
+            </a:r>
+            <a:r>
+              <a:rPr lang="en-US" sz="3200" strike="noStrike" dirty="0" smtClean="0">
+                <a:solidFill>
+                  <a:srgbClr val="000000"/>
+                </a:solidFill>
+                <a:latin typeface="Corbel"/>
+              </a:rPr>
+              <a:t>.</a:t>
+            </a:r>
           </a:p>
           <a:p>
             <a:pPr>
@@ -4919,24 +5856,12 @@
               <a:buFont typeface="Wingdings 2" charset="2"/>
               <a:buChar char=""/>
             </a:pPr>
-            <a:r>
-              <a:rPr lang="en-US" sz="3200" strike="noStrike">
-                <a:solidFill>
-                  <a:srgbClr val="000000"/>
-                </a:solidFill>
-                <a:latin typeface="Corbel"/>
-              </a:rPr>
-              <a:t>Impossible to meet demands, ask for information that we could not retrieve from LDAP</a:t>
-            </a:r>
-            <a:endParaRPr/>
-          </a:p>
-          <a:p>
-            <a:pPr>
-              <a:lnSpc>
-                <a:spcPct val="100000"/>
-              </a:lnSpc>
-            </a:pPr>
-            <a:endParaRPr/>
+            <a:endParaRPr lang="en-US" sz="3200" dirty="0">
+              <a:solidFill>
+                <a:srgbClr val="000000"/>
+              </a:solidFill>
+              <a:latin typeface="Corbel"/>
+            </a:endParaRPr>
           </a:p>
           <a:p>
             <a:pPr>
@@ -4948,52 +5873,39 @@
               <a:buChar char=""/>
             </a:pPr>
             <a:r>
-              <a:rPr lang="en-US" sz="3200" strike="noStrike">
+              <a:rPr lang="en-US" sz="3200" dirty="0" smtClean="0">
                 <a:solidFill>
                   <a:srgbClr val="000000"/>
                 </a:solidFill>
                 <a:latin typeface="Corbel"/>
               </a:rPr>
-              <a:t>Anything else?...</a:t>
-            </a:r>
-            <a:endParaRPr/>
-          </a:p>
-          <a:p>
-            <a:pPr>
-              <a:lnSpc>
-                <a:spcPct val="100000"/>
-              </a:lnSpc>
-            </a:pPr>
-            <a:endParaRPr/>
-          </a:p>
-          <a:p>
-            <a:pPr>
-              <a:lnSpc>
-                <a:spcPct val="100000"/>
-              </a:lnSpc>
-            </a:pPr>
-            <a:endParaRPr/>
+              <a:t>Failure to bind LDAP</a:t>
+            </a:r>
+            <a:endParaRPr dirty="0"/>
           </a:p>
         </p:txBody>
       </p:sp>
     </p:spTree>
   </p:cSld>
+  <p:clrMapOvr>
+    <a:masterClrMapping/>
+  </p:clrMapOvr>
   <p:timing>
     <p:tnLst>
       <p:par>
-        <p:cTn id="17" dur="indefinite" restart="never" nodeType="tmRoot">
+        <p:cTn id="1" dur="indefinite" restart="never" nodeType="tmRoot">
           <p:childTnLst>
             <p:seq>
-              <p:cTn id="18" nodeType="mainSeq"/>
+              <p:cTn id="2" nodeType="mainSeq"/>
               <p:prevCondLst>
-                <p:cond delay="0" evt="onPrev">
+                <p:cond evt="onPrev" delay="0">
                   <p:tgtEl>
                     <p:sldTgt/>
                   </p:tgtEl>
                 </p:cond>
               </p:prevCondLst>
               <p:nextCondLst>
-                <p:cond delay="0" evt="onNext">
+                <p:cond evt="onNext" delay="0">
                   <p:tgtEl>
                     <p:sldTgt/>
                   </p:tgtEl>
@@ -5228,6 +6140,8 @@
       </a:bgFillStyleLst>
     </a:fmtScheme>
   </a:themeElements>
+  <a:objectDefaults/>
+  <a:extraClrSchemeLst/>
 </a:theme>
 </file>
 
@@ -5451,5 +6365,7 @@
       </a:bgFillStyleLst>
     </a:fmtScheme>
   </a:themeElements>
+  <a:objectDefaults/>
+  <a:extraClrSchemeLst/>
 </a:theme>
 </file>
</xml_diff>